<commit_message>
amélioration du chapitre 4 et intégration au mémoire final
</commit_message>
<xml_diff>
--- a/CH3. modélisation du rotor/Figures/Figures.pptx
+++ b/CH3. modélisation du rotor/Figures/Figures.pptx
@@ -8,7 +8,7 @@
     <p:sldId id="273" r:id="rId2"/>
     <p:sldId id="270" r:id="rId3"/>
     <p:sldId id="274" r:id="rId4"/>
-    <p:sldId id="258" r:id="rId5"/>
+    <p:sldId id="278" r:id="rId5"/>
     <p:sldId id="259" r:id="rId6"/>
     <p:sldId id="263" r:id="rId7"/>
     <p:sldId id="260" r:id="rId8"/>
@@ -1467,11 +1467,11 @@
           <c:showPercent val="0"/>
           <c:showBubbleSize val="0"/>
         </c:dLbls>
-        <c:axId val="514520704"/>
-        <c:axId val="514517568"/>
+        <c:axId val="472619584"/>
+        <c:axId val="472619976"/>
       </c:scatterChart>
       <c:valAx>
-        <c:axId val="514520704"/>
+        <c:axId val="472619584"/>
         <c:scaling>
           <c:orientation val="minMax"/>
         </c:scaling>
@@ -1582,12 +1582,12 @@
             <a:endParaRPr lang="fr-FR"/>
           </a:p>
         </c:txPr>
-        <c:crossAx val="514517568"/>
+        <c:crossAx val="472619976"/>
         <c:crosses val="autoZero"/>
         <c:crossBetween val="midCat"/>
       </c:valAx>
       <c:valAx>
-        <c:axId val="514517568"/>
+        <c:axId val="472619976"/>
         <c:scaling>
           <c:orientation val="maxMin"/>
           <c:max val="35"/>
@@ -1700,7 +1700,7 @@
             <a:endParaRPr lang="fr-FR"/>
           </a:p>
         </c:txPr>
-        <c:crossAx val="514520704"/>
+        <c:crossAx val="472619584"/>
         <c:crosses val="autoZero"/>
         <c:crossBetween val="midCat"/>
         <c:majorUnit val="10"/>
@@ -7612,11 +7612,11 @@
           <c:showPercent val="0"/>
           <c:showBubbleSize val="0"/>
         </c:dLbls>
-        <c:axId val="514540304"/>
-        <c:axId val="514539128"/>
+        <c:axId val="147628072"/>
+        <c:axId val="147153984"/>
       </c:scatterChart>
       <c:valAx>
-        <c:axId val="514540304"/>
+        <c:axId val="147628072"/>
         <c:scaling>
           <c:orientation val="minMax"/>
           <c:max val="6000"/>
@@ -7700,12 +7700,12 @@
         <c:majorTickMark val="none"/>
         <c:minorTickMark val="none"/>
         <c:tickLblPos val="low"/>
-        <c:crossAx val="514539128"/>
+        <c:crossAx val="147153984"/>
         <c:crosses val="autoZero"/>
         <c:crossBetween val="midCat"/>
       </c:valAx>
       <c:valAx>
-        <c:axId val="514539128"/>
+        <c:axId val="147153984"/>
         <c:scaling>
           <c:logBase val="10"/>
           <c:orientation val="minMax"/>
@@ -7784,7 +7784,7 @@
         <c:majorTickMark val="none"/>
         <c:minorTickMark val="none"/>
         <c:tickLblPos val="nextTo"/>
-        <c:crossAx val="514540304"/>
+        <c:crossAx val="147628072"/>
         <c:crosses val="autoZero"/>
         <c:crossBetween val="midCat"/>
       </c:valAx>
@@ -9554,7 +9554,7 @@
           <a:p>
             <a:fld id="{0AA85B57-4734-4699-BEFC-70C8ADF40FD5}" type="datetimeFigureOut">
               <a:rPr lang="fr-FR" smtClean="0"/>
-              <a:t>18/12/2018</a:t>
+              <a:t>28/12/2018</a:t>
             </a:fld>
             <a:endParaRPr lang="fr-FR"/>
           </a:p>
@@ -9724,7 +9724,7 @@
           <a:p>
             <a:fld id="{0AA85B57-4734-4699-BEFC-70C8ADF40FD5}" type="datetimeFigureOut">
               <a:rPr lang="fr-FR" smtClean="0"/>
-              <a:t>18/12/2018</a:t>
+              <a:t>28/12/2018</a:t>
             </a:fld>
             <a:endParaRPr lang="fr-FR"/>
           </a:p>
@@ -9904,7 +9904,7 @@
           <a:p>
             <a:fld id="{0AA85B57-4734-4699-BEFC-70C8ADF40FD5}" type="datetimeFigureOut">
               <a:rPr lang="fr-FR" smtClean="0"/>
-              <a:t>18/12/2018</a:t>
+              <a:t>28/12/2018</a:t>
             </a:fld>
             <a:endParaRPr lang="fr-FR"/>
           </a:p>
@@ -10074,7 +10074,7 @@
           <a:p>
             <a:fld id="{0AA85B57-4734-4699-BEFC-70C8ADF40FD5}" type="datetimeFigureOut">
               <a:rPr lang="fr-FR" smtClean="0"/>
-              <a:t>18/12/2018</a:t>
+              <a:t>28/12/2018</a:t>
             </a:fld>
             <a:endParaRPr lang="fr-FR"/>
           </a:p>
@@ -10320,7 +10320,7 @@
           <a:p>
             <a:fld id="{0AA85B57-4734-4699-BEFC-70C8ADF40FD5}" type="datetimeFigureOut">
               <a:rPr lang="fr-FR" smtClean="0"/>
-              <a:t>18/12/2018</a:t>
+              <a:t>28/12/2018</a:t>
             </a:fld>
             <a:endParaRPr lang="fr-FR"/>
           </a:p>
@@ -10552,7 +10552,7 @@
           <a:p>
             <a:fld id="{0AA85B57-4734-4699-BEFC-70C8ADF40FD5}" type="datetimeFigureOut">
               <a:rPr lang="fr-FR" smtClean="0"/>
-              <a:t>18/12/2018</a:t>
+              <a:t>28/12/2018</a:t>
             </a:fld>
             <a:endParaRPr lang="fr-FR"/>
           </a:p>
@@ -10919,7 +10919,7 @@
           <a:p>
             <a:fld id="{0AA85B57-4734-4699-BEFC-70C8ADF40FD5}" type="datetimeFigureOut">
               <a:rPr lang="fr-FR" smtClean="0"/>
-              <a:t>18/12/2018</a:t>
+              <a:t>28/12/2018</a:t>
             </a:fld>
             <a:endParaRPr lang="fr-FR"/>
           </a:p>
@@ -11037,7 +11037,7 @@
           <a:p>
             <a:fld id="{0AA85B57-4734-4699-BEFC-70C8ADF40FD5}" type="datetimeFigureOut">
               <a:rPr lang="fr-FR" smtClean="0"/>
-              <a:t>18/12/2018</a:t>
+              <a:t>28/12/2018</a:t>
             </a:fld>
             <a:endParaRPr lang="fr-FR"/>
           </a:p>
@@ -11132,7 +11132,7 @@
           <a:p>
             <a:fld id="{0AA85B57-4734-4699-BEFC-70C8ADF40FD5}" type="datetimeFigureOut">
               <a:rPr lang="fr-FR" smtClean="0"/>
-              <a:t>18/12/2018</a:t>
+              <a:t>28/12/2018</a:t>
             </a:fld>
             <a:endParaRPr lang="fr-FR"/>
           </a:p>
@@ -11409,7 +11409,7 @@
           <a:p>
             <a:fld id="{0AA85B57-4734-4699-BEFC-70C8ADF40FD5}" type="datetimeFigureOut">
               <a:rPr lang="fr-FR" smtClean="0"/>
-              <a:t>18/12/2018</a:t>
+              <a:t>28/12/2018</a:t>
             </a:fld>
             <a:endParaRPr lang="fr-FR"/>
           </a:p>
@@ -11662,7 +11662,7 @@
           <a:p>
             <a:fld id="{0AA85B57-4734-4699-BEFC-70C8ADF40FD5}" type="datetimeFigureOut">
               <a:rPr lang="fr-FR" smtClean="0"/>
-              <a:t>18/12/2018</a:t>
+              <a:t>28/12/2018</a:t>
             </a:fld>
             <a:endParaRPr lang="fr-FR"/>
           </a:p>
@@ -11875,7 +11875,7 @@
           <a:p>
             <a:fld id="{0AA85B57-4734-4699-BEFC-70C8ADF40FD5}" type="datetimeFigureOut">
               <a:rPr lang="fr-FR" smtClean="0"/>
-              <a:t>18/12/2018</a:t>
+              <a:t>28/12/2018</a:t>
             </a:fld>
             <a:endParaRPr lang="fr-FR"/>
           </a:p>
@@ -13772,21 +13772,21 @@
                 <a:gridCol w="1726819">
                   <a:extLst>
                     <a:ext uri="{9D8B030D-6E8A-4147-A177-3AD203B41FA5}">
-                      <a16:colId xmlns="" xmlns:a16="http://schemas.microsoft.com/office/drawing/2014/main" val="20000"/>
+                      <a16:colId xmlns:a16="http://schemas.microsoft.com/office/drawing/2014/main" xmlns="" val="20000"/>
                     </a:ext>
                   </a:extLst>
                 </a:gridCol>
                 <a:gridCol w="1726819">
                   <a:extLst>
                     <a:ext uri="{9D8B030D-6E8A-4147-A177-3AD203B41FA5}">
-                      <a16:colId xmlns="" xmlns:a16="http://schemas.microsoft.com/office/drawing/2014/main" val="20001"/>
+                      <a16:colId xmlns:a16="http://schemas.microsoft.com/office/drawing/2014/main" xmlns="" val="20001"/>
                     </a:ext>
                   </a:extLst>
                 </a:gridCol>
                 <a:gridCol w="1726819">
                   <a:extLst>
                     <a:ext uri="{9D8B030D-6E8A-4147-A177-3AD203B41FA5}">
-                      <a16:colId xmlns="" xmlns:a16="http://schemas.microsoft.com/office/drawing/2014/main" val="20002"/>
+                      <a16:colId xmlns:a16="http://schemas.microsoft.com/office/drawing/2014/main" xmlns="" val="20002"/>
                     </a:ext>
                   </a:extLst>
                 </a:gridCol>
@@ -13914,7 +13914,7 @@
                 </a:tc>
                 <a:extLst>
                   <a:ext uri="{0D108BD9-81ED-4DB2-BD59-A6C34878D82A}">
-                    <a16:rowId xmlns="" xmlns:a16="http://schemas.microsoft.com/office/drawing/2014/main" val="10000"/>
+                    <a16:rowId xmlns:a16="http://schemas.microsoft.com/office/drawing/2014/main" xmlns="" val="10000"/>
                   </a:ext>
                 </a:extLst>
               </a:tr>
@@ -14046,7 +14046,7 @@
                 </a:tc>
                 <a:extLst>
                   <a:ext uri="{0D108BD9-81ED-4DB2-BD59-A6C34878D82A}">
-                    <a16:rowId xmlns="" xmlns:a16="http://schemas.microsoft.com/office/drawing/2014/main" val="10001"/>
+                    <a16:rowId xmlns:a16="http://schemas.microsoft.com/office/drawing/2014/main" xmlns="" val="10001"/>
                   </a:ext>
                 </a:extLst>
               </a:tr>
@@ -14182,7 +14182,7 @@
                 </a:tc>
                 <a:extLst>
                   <a:ext uri="{0D108BD9-81ED-4DB2-BD59-A6C34878D82A}">
-                    <a16:rowId xmlns="" xmlns:a16="http://schemas.microsoft.com/office/drawing/2014/main" val="10002"/>
+                    <a16:rowId xmlns:a16="http://schemas.microsoft.com/office/drawing/2014/main" xmlns="" val="10002"/>
                   </a:ext>
                 </a:extLst>
               </a:tr>
@@ -14346,7 +14346,7 @@
                 </a:tc>
                 <a:extLst>
                   <a:ext uri="{0D108BD9-81ED-4DB2-BD59-A6C34878D82A}">
-                    <a16:rowId xmlns="" xmlns:a16="http://schemas.microsoft.com/office/drawing/2014/main" val="10003"/>
+                    <a16:rowId xmlns:a16="http://schemas.microsoft.com/office/drawing/2014/main" xmlns="" val="10003"/>
                   </a:ext>
                 </a:extLst>
               </a:tr>
@@ -14421,14 +14421,14 @@
                     <a:gridCol w="4728396">
                       <a:extLst>
                         <a:ext uri="{9D8B030D-6E8A-4147-A177-3AD203B41FA5}">
-                          <a16:colId xmlns="" xmlns:a16="http://schemas.microsoft.com/office/drawing/2014/main" val="20000"/>
+                          <a16:colId xmlns:a16="http://schemas.microsoft.com/office/drawing/2014/main" xmlns="" val="20000"/>
                         </a:ext>
                       </a:extLst>
                     </a:gridCol>
                     <a:gridCol w="3399604">
                       <a:extLst>
                         <a:ext uri="{9D8B030D-6E8A-4147-A177-3AD203B41FA5}">
-                          <a16:colId xmlns="" xmlns:a16="http://schemas.microsoft.com/office/drawing/2014/main" val="20001"/>
+                          <a16:colId xmlns:a16="http://schemas.microsoft.com/office/drawing/2014/main" xmlns="" val="20001"/>
                         </a:ext>
                       </a:extLst>
                     </a:gridCol>
@@ -14526,7 +14526,7 @@
                     </a:tc>
                     <a:extLst>
                       <a:ext uri="{0D108BD9-81ED-4DB2-BD59-A6C34878D82A}">
-                        <a16:rowId xmlns="" xmlns:a16="http://schemas.microsoft.com/office/drawing/2014/main" val="10000"/>
+                        <a16:rowId xmlns:a16="http://schemas.microsoft.com/office/drawing/2014/main" xmlns="" val="10000"/>
                       </a:ext>
                     </a:extLst>
                   </a:tr>
@@ -14737,7 +14737,7 @@
                     </a:tc>
                     <a:extLst>
                       <a:ext uri="{0D108BD9-81ED-4DB2-BD59-A6C34878D82A}">
-                        <a16:rowId xmlns="" xmlns:a16="http://schemas.microsoft.com/office/drawing/2014/main" val="10001"/>
+                        <a16:rowId xmlns:a16="http://schemas.microsoft.com/office/drawing/2014/main" xmlns="" val="10001"/>
                       </a:ext>
                     </a:extLst>
                   </a:tr>
@@ -14994,7 +14994,7 @@
                     </a:tc>
                     <a:extLst>
                       <a:ext uri="{0D108BD9-81ED-4DB2-BD59-A6C34878D82A}">
-                        <a16:rowId xmlns="" xmlns:a16="http://schemas.microsoft.com/office/drawing/2014/main" val="10002"/>
+                        <a16:rowId xmlns:a16="http://schemas.microsoft.com/office/drawing/2014/main" xmlns="" val="10002"/>
                       </a:ext>
                     </a:extLst>
                   </a:tr>
@@ -15282,7 +15282,7 @@
                     </a:tc>
                     <a:extLst>
                       <a:ext uri="{0D108BD9-81ED-4DB2-BD59-A6C34878D82A}">
-                        <a16:rowId xmlns="" xmlns:a16="http://schemas.microsoft.com/office/drawing/2014/main" val="10003"/>
+                        <a16:rowId xmlns:a16="http://schemas.microsoft.com/office/drawing/2014/main" xmlns="" val="10003"/>
                       </a:ext>
                     </a:extLst>
                   </a:tr>
@@ -15502,7 +15502,7 @@
                     </a:tc>
                     <a:extLst>
                       <a:ext uri="{0D108BD9-81ED-4DB2-BD59-A6C34878D82A}">
-                        <a16:rowId xmlns="" xmlns:a16="http://schemas.microsoft.com/office/drawing/2014/main" val="10004"/>
+                        <a16:rowId xmlns:a16="http://schemas.microsoft.com/office/drawing/2014/main" xmlns="" val="10004"/>
                       </a:ext>
                     </a:extLst>
                   </a:tr>
@@ -15953,14 +15953,14 @@
                     <a:gridCol w="1726819">
                       <a:extLst>
                         <a:ext uri="{9D8B030D-6E8A-4147-A177-3AD203B41FA5}">
-                          <a16:colId xmlns="" xmlns:a16="http://schemas.microsoft.com/office/drawing/2014/main" val="20000"/>
+                          <a16:colId xmlns:a16="http://schemas.microsoft.com/office/drawing/2014/main" xmlns="" val="20000"/>
                         </a:ext>
                       </a:extLst>
                     </a:gridCol>
                     <a:gridCol w="1726819">
                       <a:extLst>
                         <a:ext uri="{9D8B030D-6E8A-4147-A177-3AD203B41FA5}">
-                          <a16:colId xmlns="" xmlns:a16="http://schemas.microsoft.com/office/drawing/2014/main" val="20001"/>
+                          <a16:colId xmlns:a16="http://schemas.microsoft.com/office/drawing/2014/main" xmlns="" val="20001"/>
                         </a:ext>
                       </a:extLst>
                     </a:gridCol>
@@ -16056,7 +16056,7 @@
                     </a:tc>
                     <a:extLst>
                       <a:ext uri="{0D108BD9-81ED-4DB2-BD59-A6C34878D82A}">
-                        <a16:rowId xmlns="" xmlns:a16="http://schemas.microsoft.com/office/drawing/2014/main" val="10000"/>
+                        <a16:rowId xmlns:a16="http://schemas.microsoft.com/office/drawing/2014/main" xmlns="" val="10000"/>
                       </a:ext>
                     </a:extLst>
                   </a:tr>
@@ -16154,7 +16154,7 @@
                     </a:tc>
                     <a:extLst>
                       <a:ext uri="{0D108BD9-81ED-4DB2-BD59-A6C34878D82A}">
-                        <a16:rowId xmlns="" xmlns:a16="http://schemas.microsoft.com/office/drawing/2014/main" val="10001"/>
+                        <a16:rowId xmlns:a16="http://schemas.microsoft.com/office/drawing/2014/main" xmlns="" val="10001"/>
                       </a:ext>
                     </a:extLst>
                   </a:tr>
@@ -16265,7 +16265,7 @@
                     </a:tc>
                     <a:extLst>
                       <a:ext uri="{0D108BD9-81ED-4DB2-BD59-A6C34878D82A}">
-                        <a16:rowId xmlns="" xmlns:a16="http://schemas.microsoft.com/office/drawing/2014/main" val="10002"/>
+                        <a16:rowId xmlns:a16="http://schemas.microsoft.com/office/drawing/2014/main" xmlns="" val="10002"/>
                       </a:ext>
                     </a:extLst>
                   </a:tr>
@@ -16376,7 +16376,7 @@
                     </a:tc>
                     <a:extLst>
                       <a:ext uri="{0D108BD9-81ED-4DB2-BD59-A6C34878D82A}">
-                        <a16:rowId xmlns="" xmlns:a16="http://schemas.microsoft.com/office/drawing/2014/main" val="10003"/>
+                        <a16:rowId xmlns:a16="http://schemas.microsoft.com/office/drawing/2014/main" xmlns="" val="10003"/>
                       </a:ext>
                     </a:extLst>
                   </a:tr>
@@ -16506,7 +16506,7 @@
                     </a:tc>
                     <a:extLst>
                       <a:ext uri="{0D108BD9-81ED-4DB2-BD59-A6C34878D82A}">
-                        <a16:rowId xmlns="" xmlns:a16="http://schemas.microsoft.com/office/drawing/2014/main" val="10004"/>
+                        <a16:rowId xmlns:a16="http://schemas.microsoft.com/office/drawing/2014/main" xmlns="" val="10004"/>
                       </a:ext>
                     </a:extLst>
                   </a:tr>
@@ -19756,10 +19756,10 @@
           </p:nvGrpSpPr>
           <p:grpSpPr>
             <a:xfrm>
-              <a:off x="2697849" y="2978539"/>
-              <a:ext cx="1147385" cy="1627398"/>
-              <a:chOff x="2666529" y="3675601"/>
-              <a:chExt cx="1147385" cy="1627398"/>
+              <a:off x="2357100" y="2978539"/>
+              <a:ext cx="1488134" cy="1627398"/>
+              <a:chOff x="2325780" y="3675601"/>
+              <a:chExt cx="1488134" cy="1627398"/>
             </a:xfrm>
           </p:grpSpPr>
           <p:cxnSp>
@@ -20500,8 +20500,8 @@
               </p:style>
             </p:cxnSp>
           </p:grpSp>
-          <mc:AlternateContent xmlns:mc="http://schemas.openxmlformats.org/markup-compatibility/2006" xmlns:a14="http://schemas.microsoft.com/office/drawing/2010/main">
-            <mc:Choice Requires="a14">
+          <mc:AlternateContent xmlns:mc="http://schemas.openxmlformats.org/markup-compatibility/2006">
+            <mc:Choice xmlns:a14="http://schemas.microsoft.com/office/drawing/2010/main" Requires="a14">
               <p:sp>
                 <p:nvSpPr>
                   <p:cNvPr id="188" name="ZoneTexte 187"/>
@@ -20510,8 +20510,8 @@
                 </p:nvSpPr>
                 <p:spPr>
                   <a:xfrm>
-                    <a:off x="2666529" y="4701384"/>
-                    <a:ext cx="664990" cy="307777"/>
+                    <a:off x="2325780" y="4691573"/>
+                    <a:ext cx="1054519" cy="307777"/>
                   </a:xfrm>
                   <a:prstGeom prst="rect">
                     <a:avLst/>
@@ -20552,7 +20552,13 @@
                                 <a:rPr lang="fr-FR" sz="1400" b="1" i="1" dirty="0" smtClean="0">
                                   <a:latin typeface="Cambria Math" panose="02040503050406030204" pitchFamily="18" charset="0"/>
                                 </a:rPr>
-                                <m:t>𝒓𝒍𝒎𝒕</m:t>
+                                <m:t>𝒓</m:t>
+                              </m:r>
+                              <m:r>
+                                <a:rPr lang="fr-FR" sz="1400" b="1" i="1" dirty="0" smtClean="0">
+                                  <a:latin typeface="Cambria Math" panose="02040503050406030204" pitchFamily="18" charset="0"/>
+                                </a:rPr>
+                                <m:t>𝒐𝒖𝒍𝒆𝒎𝒆𝒏𝒕</m:t>
                               </m:r>
                             </m:sub>
                           </m:sSub>
@@ -20564,7 +20570,7 @@
                 </p:txBody>
               </p:sp>
             </mc:Choice>
-            <mc:Fallback xmlns="">
+            <mc:Fallback>
               <p:sp>
                 <p:nvSpPr>
                   <p:cNvPr id="188" name="ZoneTexte 187"/>
@@ -20575,8 +20581,8 @@
                 </p:nvSpPr>
                 <p:spPr>
                   <a:xfrm>
-                    <a:off x="2666529" y="4701384"/>
-                    <a:ext cx="664990" cy="307777"/>
+                    <a:off x="2325780" y="4691573"/>
+                    <a:ext cx="1054519" cy="307777"/>
                   </a:xfrm>
                   <a:prstGeom prst="rect">
                     <a:avLst/>
@@ -21013,13 +21019,30 @@
                 </a:spcAft>
               </a:pPr>
               <a:r>
+                <a:rPr lang="fr-FR" dirty="0">
+                  <a:latin typeface="Times New Roman" panose="02020603050405020304" pitchFamily="18" charset="0"/>
+                  <a:ea typeface="Calibri" panose="020F0502020204030204" pitchFamily="34" charset="0"/>
+                  <a:cs typeface="Times New Roman" panose="02020603050405020304" pitchFamily="18" charset="0"/>
+                </a:rPr>
+                <a:t>n</a:t>
+              </a:r>
+              <a:r>
                 <a:rPr lang="fr-FR" sz="1800" dirty="0" smtClean="0">
                   <a:effectLst/>
                   <a:latin typeface="Times New Roman" panose="02020603050405020304" pitchFamily="18" charset="0"/>
                   <a:ea typeface="Calibri" panose="020F0502020204030204" pitchFamily="34" charset="0"/>
                   <a:cs typeface="Times New Roman" panose="02020603050405020304" pitchFamily="18" charset="0"/>
                 </a:rPr>
-                <a:t>Nœuds maître</a:t>
+                <a:t>œuds </a:t>
+              </a:r>
+              <a:r>
+                <a:rPr lang="fr-FR" sz="1800" dirty="0" smtClean="0">
+                  <a:effectLst/>
+                  <a:latin typeface="Times New Roman" panose="02020603050405020304" pitchFamily="18" charset="0"/>
+                  <a:ea typeface="Calibri" panose="020F0502020204030204" pitchFamily="34" charset="0"/>
+                  <a:cs typeface="Times New Roman" panose="02020603050405020304" pitchFamily="18" charset="0"/>
+                </a:rPr>
+                <a:t>maître</a:t>
               </a:r>
               <a:endParaRPr lang="fr-FR" sz="1100" dirty="0">
                 <a:effectLst/>
@@ -22330,8 +22353,8 @@
               </p:style>
             </p:cxnSp>
           </p:grpSp>
-          <mc:AlternateContent xmlns:mc="http://schemas.openxmlformats.org/markup-compatibility/2006" xmlns:a14="http://schemas.microsoft.com/office/drawing/2010/main">
-            <mc:Choice Requires="a14">
+          <mc:AlternateContent xmlns:mc="http://schemas.openxmlformats.org/markup-compatibility/2006">
+            <mc:Choice xmlns:a14="http://schemas.microsoft.com/office/drawing/2010/main" Requires="a14">
               <p:sp>
                 <p:nvSpPr>
                   <p:cNvPr id="134" name="ZoneTexte 133"/>
@@ -22341,7 +22364,7 @@
                 <p:spPr>
                   <a:xfrm>
                     <a:off x="2666529" y="4701384"/>
-                    <a:ext cx="535146" cy="327077"/>
+                    <a:ext cx="772391" cy="327077"/>
                   </a:xfrm>
                   <a:prstGeom prst="rect">
                     <a:avLst/>
@@ -22382,7 +22405,13 @@
                                 <a:rPr lang="fr-FR" sz="1400" b="1" i="1" dirty="0" smtClean="0">
                                   <a:latin typeface="Cambria Math" panose="02040503050406030204" pitchFamily="18" charset="0"/>
                                 </a:rPr>
-                                <m:t>𝒑𝒉</m:t>
+                                <m:t>𝒑</m:t>
+                              </m:r>
+                              <m:r>
+                                <a:rPr lang="fr-FR" sz="1400" b="1" i="1" dirty="0" smtClean="0">
+                                  <a:latin typeface="Cambria Math" panose="02040503050406030204" pitchFamily="18" charset="0"/>
+                                </a:rPr>
+                                <m:t>𝒂𝒍𝒊𝒆𝒓</m:t>
                               </m:r>
                             </m:sub>
                           </m:sSub>
@@ -22394,7 +22423,7 @@
                 </p:txBody>
               </p:sp>
             </mc:Choice>
-            <mc:Fallback xmlns="">
+            <mc:Fallback>
               <p:sp>
                 <p:nvSpPr>
                   <p:cNvPr id="134" name="ZoneTexte 133"/>
@@ -22406,7 +22435,7 @@
                 <p:spPr>
                   <a:xfrm>
                     <a:off x="2666529" y="4701384"/>
-                    <a:ext cx="535146" cy="327077"/>
+                    <a:ext cx="772391" cy="327077"/>
                   </a:xfrm>
                   <a:prstGeom prst="rect">
                     <a:avLst/>
@@ -22414,7 +22443,7 @@
                   <a:blipFill rotWithShape="0">
                     <a:blip r:embed="rId6"/>
                     <a:stretch>
-                      <a:fillRect b="-3704"/>
+                      <a:fillRect/>
                     </a:stretch>
                   </a:blipFill>
                 </p:spPr>
@@ -28251,16 +28280,16 @@
       </p:grpSpPr>
       <p:grpSp>
         <p:nvGrpSpPr>
-          <p:cNvPr id="37" name="Groupe 36"/>
+          <p:cNvPr id="12" name="Groupe 11"/>
           <p:cNvGrpSpPr/>
           <p:nvPr/>
         </p:nvGrpSpPr>
         <p:grpSpPr>
           <a:xfrm>
-            <a:off x="1146808" y="83534"/>
-            <a:ext cx="10142907" cy="3707023"/>
-            <a:chOff x="1356358" y="283559"/>
-            <a:chExt cx="10142907" cy="3707023"/>
+            <a:off x="1105711" y="1347256"/>
+            <a:ext cx="10142907" cy="3724274"/>
+            <a:chOff x="1105711" y="1347256"/>
+            <a:chExt cx="10142907" cy="3724274"/>
           </a:xfrm>
         </p:grpSpPr>
         <p:grpSp>
@@ -28271,10 +28300,10 @@
           </p:nvGrpSpPr>
           <p:grpSpPr>
             <a:xfrm>
-              <a:off x="1356358" y="825351"/>
-              <a:ext cx="9320738" cy="3024574"/>
+              <a:off x="1105711" y="1889048"/>
+              <a:ext cx="9320738" cy="3182482"/>
               <a:chOff x="1356358" y="825351"/>
-              <a:chExt cx="9320738" cy="3024574"/>
+              <a:chExt cx="9320738" cy="3182482"/>
             </a:xfrm>
           </p:grpSpPr>
           <p:grpSp>
@@ -29045,7 +29074,7 @@
             </p:nvSpPr>
             <p:spPr>
               <a:xfrm>
-                <a:off x="3017960" y="3480593"/>
+                <a:off x="3007214" y="3638501"/>
                 <a:ext cx="880241" cy="369332"/>
               </a:xfrm>
               <a:prstGeom prst="rect">
@@ -29075,7 +29104,7 @@
             </p:nvSpPr>
             <p:spPr>
               <a:xfrm>
-                <a:off x="7106781" y="3480593"/>
+                <a:off x="7106781" y="3633401"/>
                 <a:ext cx="880241" cy="369332"/>
               </a:xfrm>
               <a:prstGeom prst="rect">
@@ -29137,10 +29166,10 @@
           </p:nvGrpSpPr>
           <p:grpSpPr>
             <a:xfrm>
-              <a:off x="2159014" y="283559"/>
-              <a:ext cx="9340251" cy="3707023"/>
-              <a:chOff x="2159014" y="283559"/>
-              <a:chExt cx="9340251" cy="3707023"/>
+              <a:off x="3187811" y="1347256"/>
+              <a:ext cx="8060807" cy="3707023"/>
+              <a:chOff x="3438458" y="283559"/>
+              <a:chExt cx="8060807" cy="3707023"/>
             </a:xfrm>
           </p:grpSpPr>
           <p:grpSp>
@@ -29151,10 +29180,10 @@
             </p:nvGrpSpPr>
             <p:grpSpPr>
               <a:xfrm>
-                <a:off x="2159014" y="876430"/>
-                <a:ext cx="1601684" cy="2647406"/>
-                <a:chOff x="1950916" y="1650642"/>
-                <a:chExt cx="1601684" cy="2647406"/>
+                <a:off x="3438458" y="876430"/>
+                <a:ext cx="1342699" cy="2674777"/>
+                <a:chOff x="3230360" y="1650642"/>
+                <a:chExt cx="1342699" cy="2674777"/>
               </a:xfrm>
             </p:grpSpPr>
             <p:cxnSp>
@@ -29164,9 +29193,9 @@
                 <p:nvPr/>
               </p:nvCxnSpPr>
               <p:spPr>
-                <a:xfrm flipH="1">
-                  <a:off x="2413440" y="3313435"/>
-                  <a:ext cx="825797" cy="535643"/>
+                <a:xfrm flipV="1">
+                  <a:off x="3239238" y="2766326"/>
+                  <a:ext cx="843473" cy="547109"/>
                 </a:xfrm>
                 <a:prstGeom prst="straightConnector1">
                   <a:avLst/>
@@ -29190,8 +29219,8 @@
                 </a:fontRef>
               </p:style>
             </p:cxnSp>
-            <mc:AlternateContent xmlns:mc="http://schemas.openxmlformats.org/markup-compatibility/2006" xmlns:a14="http://schemas.microsoft.com/office/drawing/2010/main">
-              <mc:Choice Requires="a14">
+            <mc:AlternateContent xmlns:mc="http://schemas.openxmlformats.org/markup-compatibility/2006">
+              <mc:Choice xmlns:a14="http://schemas.microsoft.com/office/drawing/2010/main" Requires="a14">
                 <p:sp>
                   <p:nvSpPr>
                     <p:cNvPr id="77" name="Zone de texte 153"/>
@@ -29200,7 +29229,7 @@
                   </p:nvSpPr>
                   <p:spPr>
                     <a:xfrm>
-                      <a:off x="3250852" y="2120374"/>
+                      <a:off x="3230360" y="4050769"/>
                       <a:ext cx="301748" cy="274650"/>
                     </a:xfrm>
                     <a:prstGeom prst="rect">
@@ -29250,8 +29279,8 @@
                             <m:jc m:val="centerGroup"/>
                           </m:oMathParaPr>
                           <m:oMath xmlns:m="http://schemas.openxmlformats.org/officeDocument/2006/math">
-                            <m:sSub>
-                              <m:sSubPr>
+                            <m:sSubSup>
+                              <m:sSubSupPr>
                                 <m:ctrlPr>
                                   <a:rPr lang="fr-FR" b="1" i="1" smtClean="0">
                                     <a:latin typeface="Cambria Math" panose="02040503050406030204" pitchFamily="18" charset="0"/>
@@ -29259,7 +29288,7 @@
                                     <a:cs typeface="Times New Roman" panose="02020603050405020304" pitchFamily="18" charset="0"/>
                                   </a:rPr>
                                 </m:ctrlPr>
-                              </m:sSubPr>
+                              </m:sSubSupPr>
                               <m:e>
                                 <m:r>
                                   <a:rPr lang="fr-FR" b="1" i="1" smtClean="0">
@@ -29279,16 +29308,18 @@
                                   </a:rPr>
                                   <m:t>𝒙</m:t>
                                 </m:r>
+                              </m:sub>
+                              <m:sup>
                                 <m:r>
-                                  <a:rPr lang="fr-FR" b="1" i="1" smtClean="0">
+                                  <a:rPr lang="fr-FR" b="1" i="1">
                                     <a:latin typeface="Cambria Math" panose="02040503050406030204" pitchFamily="18" charset="0"/>
                                     <a:ea typeface="SimSun" panose="02010600030101010101" pitchFamily="2" charset="-122"/>
                                     <a:cs typeface="Times New Roman" panose="02020603050405020304" pitchFamily="18" charset="0"/>
                                   </a:rPr>
                                   <m:t>𝟏</m:t>
                                 </m:r>
-                              </m:sub>
-                            </m:sSub>
+                              </m:sup>
+                            </m:sSubSup>
                           </m:oMath>
                         </m:oMathPara>
                       </a14:m>
@@ -29301,7 +29332,7 @@
                   </p:txBody>
                 </p:sp>
               </mc:Choice>
-              <mc:Fallback xmlns="">
+              <mc:Fallback>
                 <p:sp>
                   <p:nvSpPr>
                     <p:cNvPr id="77" name="Zone de texte 153"/>
@@ -29312,7 +29343,7 @@
                   </p:nvSpPr>
                   <p:spPr>
                     <a:xfrm>
-                      <a:off x="3250852" y="2120374"/>
+                      <a:off x="3230360" y="4050769"/>
                       <a:ext cx="301748" cy="274650"/>
                     </a:xfrm>
                     <a:prstGeom prst="rect">
@@ -29321,7 +29352,7 @@
                     <a:blipFill rotWithShape="0">
                       <a:blip r:embed="rId5"/>
                       <a:stretch>
-                        <a:fillRect r="-34000" b="-15556"/>
+                        <a:fillRect r="-6122" b="-17778"/>
                       </a:stretch>
                     </a:blipFill>
                     <a:ln w="6350">
@@ -29345,8 +29376,8 @@
                 </p:sp>
               </mc:Fallback>
             </mc:AlternateContent>
-            <mc:AlternateContent xmlns:mc="http://schemas.openxmlformats.org/markup-compatibility/2006" xmlns:a14="http://schemas.microsoft.com/office/drawing/2010/main">
-              <mc:Choice Requires="a14">
+            <mc:AlternateContent xmlns:mc="http://schemas.openxmlformats.org/markup-compatibility/2006">
+              <mc:Choice xmlns:a14="http://schemas.microsoft.com/office/drawing/2010/main" Requires="a14">
                 <p:sp>
                   <p:nvSpPr>
                     <p:cNvPr id="78" name="Zone de texte 153"/>
@@ -29355,7 +29386,7 @@
                   </p:nvSpPr>
                   <p:spPr>
                     <a:xfrm>
-                      <a:off x="1950916" y="3725191"/>
+                      <a:off x="3983859" y="2545011"/>
                       <a:ext cx="589200" cy="274650"/>
                     </a:xfrm>
                     <a:prstGeom prst="rect">
@@ -29405,8 +29436,8 @@
                             <m:jc m:val="centerGroup"/>
                           </m:oMathParaPr>
                           <m:oMath xmlns:m="http://schemas.openxmlformats.org/officeDocument/2006/math">
-                            <m:sSub>
-                              <m:sSubPr>
+                            <m:sSubSup>
+                              <m:sSubSupPr>
                                 <m:ctrlPr>
                                   <a:rPr lang="fr-FR" b="1" i="1" smtClean="0">
                                     <a:latin typeface="Cambria Math" panose="02040503050406030204" pitchFamily="18" charset="0"/>
@@ -29414,7 +29445,7 @@
                                     <a:cs typeface="Times New Roman" panose="02020603050405020304" pitchFamily="18" charset="0"/>
                                   </a:rPr>
                                 </m:ctrlPr>
-                              </m:sSubPr>
+                              </m:sSubSupPr>
                               <m:e>
                                 <m:r>
                                   <a:rPr lang="fr-FR" b="1" i="1" smtClean="0">
@@ -29434,6 +29465,8 @@
                                   </a:rPr>
                                   <m:t>𝒚</m:t>
                                 </m:r>
+                              </m:sub>
+                              <m:sup>
                                 <m:r>
                                   <a:rPr lang="fr-FR" b="1" i="1" smtClean="0">
                                     <a:latin typeface="Cambria Math" panose="02040503050406030204" pitchFamily="18" charset="0"/>
@@ -29442,8 +29475,8 @@
                                   </a:rPr>
                                   <m:t>𝟏</m:t>
                                 </m:r>
-                              </m:sub>
-                            </m:sSub>
+                              </m:sup>
+                            </m:sSubSup>
                           </m:oMath>
                         </m:oMathPara>
                       </a14:m>
@@ -29456,7 +29489,7 @@
                   </p:txBody>
                 </p:sp>
               </mc:Choice>
-              <mc:Fallback xmlns="">
+              <mc:Fallback>
                 <p:sp>
                   <p:nvSpPr>
                     <p:cNvPr id="78" name="Zone de texte 153"/>
@@ -29467,7 +29500,7 @@
                   </p:nvSpPr>
                   <p:spPr>
                     <a:xfrm>
-                      <a:off x="1950916" y="3725191"/>
+                      <a:off x="3983859" y="2545011"/>
                       <a:ext cx="589200" cy="274650"/>
                     </a:xfrm>
                     <a:prstGeom prst="rect">
@@ -29476,7 +29509,7 @@
                     <a:blipFill rotWithShape="0">
                       <a:blip r:embed="rId6"/>
                       <a:stretch>
-                        <a:fillRect b="-35556"/>
+                        <a:fillRect b="-37778"/>
                       </a:stretch>
                     </a:blipFill>
                     <a:ln w="6350">
@@ -29507,9 +29540,9 @@
                 <p:nvPr/>
               </p:nvCxnSpPr>
               <p:spPr>
-                <a:xfrm flipV="1">
-                  <a:off x="3239237" y="2219218"/>
-                  <a:ext cx="0" cy="1094217"/>
+                <a:xfrm>
+                  <a:off x="3239237" y="3313436"/>
+                  <a:ext cx="0" cy="991333"/>
                 </a:xfrm>
                 <a:prstGeom prst="straightConnector1">
                   <a:avLst/>
@@ -29575,10 +29608,10 @@
             </p:nvGrpSpPr>
             <p:grpSpPr>
               <a:xfrm>
-                <a:off x="6467499" y="825351"/>
-                <a:ext cx="1410754" cy="2698485"/>
-                <a:chOff x="2159834" y="1599563"/>
-                <a:chExt cx="1410754" cy="2698485"/>
+                <a:off x="7546901" y="825351"/>
+                <a:ext cx="1322580" cy="2740102"/>
+                <a:chOff x="3239236" y="1599563"/>
+                <a:chExt cx="1322580" cy="2740102"/>
               </a:xfrm>
             </p:grpSpPr>
             <p:cxnSp>
@@ -29588,9 +29621,9 @@
                 <p:nvPr/>
               </p:nvCxnSpPr>
               <p:spPr>
-                <a:xfrm flipH="1">
-                  <a:off x="2291296" y="3313435"/>
-                  <a:ext cx="947941" cy="614870"/>
+                <a:xfrm flipV="1">
+                  <a:off x="3239238" y="2797148"/>
+                  <a:ext cx="795955" cy="516287"/>
                 </a:xfrm>
                 <a:prstGeom prst="straightConnector1">
                   <a:avLst/>
@@ -29614,8 +29647,8 @@
                 </a:fontRef>
               </p:style>
             </p:cxnSp>
-            <mc:AlternateContent xmlns:mc="http://schemas.openxmlformats.org/markup-compatibility/2006" xmlns:a14="http://schemas.microsoft.com/office/drawing/2010/main">
-              <mc:Choice Requires="a14">
+            <mc:AlternateContent xmlns:mc="http://schemas.openxmlformats.org/markup-compatibility/2006">
+              <mc:Choice xmlns:a14="http://schemas.microsoft.com/office/drawing/2010/main" Requires="a14">
                 <p:sp>
                   <p:nvSpPr>
                     <p:cNvPr id="85" name="Zone de texte 153"/>
@@ -29624,7 +29657,7 @@
                   </p:nvSpPr>
                   <p:spPr>
                     <a:xfrm>
-                      <a:off x="3268840" y="2089968"/>
+                      <a:off x="3239236" y="4064207"/>
                       <a:ext cx="301748" cy="274650"/>
                     </a:xfrm>
                     <a:prstGeom prst="rect">
@@ -29674,8 +29707,8 @@
                             <m:jc m:val="centerGroup"/>
                           </m:oMathParaPr>
                           <m:oMath xmlns:m="http://schemas.openxmlformats.org/officeDocument/2006/math">
-                            <m:sSub>
-                              <m:sSubPr>
+                            <m:sSubSup>
+                              <m:sSubSupPr>
                                 <m:ctrlPr>
                                   <a:rPr lang="fr-FR" b="1" i="1" smtClean="0">
                                     <a:latin typeface="Cambria Math" panose="02040503050406030204" pitchFamily="18" charset="0"/>
@@ -29683,7 +29716,7 @@
                                     <a:cs typeface="Times New Roman" panose="02020603050405020304" pitchFamily="18" charset="0"/>
                                   </a:rPr>
                                 </m:ctrlPr>
-                              </m:sSubPr>
+                              </m:sSubSupPr>
                               <m:e>
                                 <m:r>
                                   <a:rPr lang="fr-FR" b="1" i="1" smtClean="0">
@@ -29703,6 +29736,8 @@
                                   </a:rPr>
                                   <m:t>𝒙</m:t>
                                 </m:r>
+                              </m:sub>
+                              <m:sup>
                                 <m:r>
                                   <a:rPr lang="fr-FR" b="1" i="1" smtClean="0">
                                     <a:latin typeface="Cambria Math" panose="02040503050406030204" pitchFamily="18" charset="0"/>
@@ -29711,8 +29746,8 @@
                                   </a:rPr>
                                   <m:t>𝟐</m:t>
                                 </m:r>
-                              </m:sub>
-                            </m:sSub>
+                              </m:sup>
+                            </m:sSubSup>
                           </m:oMath>
                         </m:oMathPara>
                       </a14:m>
@@ -29725,7 +29760,7 @@
                   </p:txBody>
                 </p:sp>
               </mc:Choice>
-              <mc:Fallback xmlns="">
+              <mc:Fallback>
                 <p:sp>
                   <p:nvSpPr>
                     <p:cNvPr id="85" name="Zone de texte 153"/>
@@ -29736,7 +29771,7 @@
                   </p:nvSpPr>
                   <p:spPr>
                     <a:xfrm>
-                      <a:off x="3268840" y="2089968"/>
+                      <a:off x="3239236" y="4064207"/>
                       <a:ext cx="301748" cy="274650"/>
                     </a:xfrm>
                     <a:prstGeom prst="rect">
@@ -29745,7 +29780,7 @@
                     <a:blipFill rotWithShape="0">
                       <a:blip r:embed="rId7"/>
                       <a:stretch>
-                        <a:fillRect r="-34000" b="-15556"/>
+                        <a:fillRect r="-6122" b="-17778"/>
                       </a:stretch>
                     </a:blipFill>
                     <a:ln w="6350">
@@ -29769,8 +29804,8 @@
                 </p:sp>
               </mc:Fallback>
             </mc:AlternateContent>
-            <mc:AlternateContent xmlns:mc="http://schemas.openxmlformats.org/markup-compatibility/2006" xmlns:a14="http://schemas.microsoft.com/office/drawing/2010/main">
-              <mc:Choice Requires="a14">
+            <mc:AlternateContent xmlns:mc="http://schemas.openxmlformats.org/markup-compatibility/2006">
+              <mc:Choice xmlns:a14="http://schemas.microsoft.com/office/drawing/2010/main" Requires="a14">
                 <p:sp>
                   <p:nvSpPr>
                     <p:cNvPr id="86" name="Zone de texte 153"/>
@@ -29779,7 +29814,7 @@
                   </p:nvSpPr>
                   <p:spPr>
                     <a:xfrm>
-                      <a:off x="2159834" y="3867318"/>
+                      <a:off x="3972616" y="2490151"/>
                       <a:ext cx="589200" cy="274650"/>
                     </a:xfrm>
                     <a:prstGeom prst="rect">
@@ -29829,8 +29864,8 @@
                             <m:jc m:val="centerGroup"/>
                           </m:oMathParaPr>
                           <m:oMath xmlns:m="http://schemas.openxmlformats.org/officeDocument/2006/math">
-                            <m:sSub>
-                              <m:sSubPr>
+                            <m:sSubSup>
+                              <m:sSubSupPr>
                                 <m:ctrlPr>
                                   <a:rPr lang="fr-FR" b="1" i="1" smtClean="0">
                                     <a:latin typeface="Cambria Math" panose="02040503050406030204" pitchFamily="18" charset="0"/>
@@ -29838,7 +29873,7 @@
                                     <a:cs typeface="Times New Roman" panose="02020603050405020304" pitchFamily="18" charset="0"/>
                                   </a:rPr>
                                 </m:ctrlPr>
-                              </m:sSubPr>
+                              </m:sSubSupPr>
                               <m:e>
                                 <m:r>
                                   <a:rPr lang="fr-FR" b="1" i="1" smtClean="0">
@@ -29858,6 +29893,8 @@
                                   </a:rPr>
                                   <m:t>𝒚</m:t>
                                 </m:r>
+                              </m:sub>
+                              <m:sup>
                                 <m:r>
                                   <a:rPr lang="fr-FR" b="1" i="1" smtClean="0">
                                     <a:latin typeface="Cambria Math" panose="02040503050406030204" pitchFamily="18" charset="0"/>
@@ -29866,8 +29903,8 @@
                                   </a:rPr>
                                   <m:t>𝟐</m:t>
                                 </m:r>
-                              </m:sub>
-                            </m:sSub>
+                              </m:sup>
+                            </m:sSubSup>
                           </m:oMath>
                         </m:oMathPara>
                       </a14:m>
@@ -29880,7 +29917,7 @@
                   </p:txBody>
                 </p:sp>
               </mc:Choice>
-              <mc:Fallback xmlns="">
+              <mc:Fallback>
                 <p:sp>
                   <p:nvSpPr>
                     <p:cNvPr id="86" name="Zone de texte 153"/>
@@ -29891,7 +29928,7 @@
                   </p:nvSpPr>
                   <p:spPr>
                     <a:xfrm>
-                      <a:off x="2159834" y="3867318"/>
+                      <a:off x="3972616" y="2490151"/>
                       <a:ext cx="589200" cy="274650"/>
                     </a:xfrm>
                     <a:prstGeom prst="rect">
@@ -29900,7 +29937,7 @@
                     <a:blipFill rotWithShape="0">
                       <a:blip r:embed="rId8"/>
                       <a:stretch>
-                        <a:fillRect b="-35556"/>
+                        <a:fillRect b="-37778"/>
                       </a:stretch>
                     </a:blipFill>
                     <a:ln w="6350">
@@ -29931,9 +29968,9 @@
                 <p:nvPr/>
               </p:nvCxnSpPr>
               <p:spPr>
-                <a:xfrm flipV="1">
-                  <a:off x="3239237" y="2254500"/>
-                  <a:ext cx="0" cy="1058935"/>
+                <a:xfrm>
+                  <a:off x="3239237" y="3313436"/>
+                  <a:ext cx="0" cy="1026229"/>
                 </a:xfrm>
                 <a:prstGeom prst="straightConnector1">
                   <a:avLst/>
@@ -31194,7 +31231,7 @@
     </p:spTree>
     <p:extLst>
       <p:ext uri="{BB962C8B-B14F-4D97-AF65-F5344CB8AC3E}">
-        <p14:creationId xmlns:p14="http://schemas.microsoft.com/office/powerpoint/2010/main" val="3257001627"/>
+        <p14:creationId xmlns:p14="http://schemas.microsoft.com/office/powerpoint/2010/main" val="4152708583"/>
       </p:ext>
     </p:extLst>
   </p:cSld>

</xml_diff>

<commit_message>
version 2.0 de la thèse
</commit_message>
<xml_diff>
--- a/CH3. modélisation du rotor/Figures/Figures.pptx
+++ b/CH3. modélisation du rotor/Figures/Figures.pptx
@@ -20,9 +20,10 @@
     <p:sldId id="268" r:id="rId14"/>
     <p:sldId id="275" r:id="rId15"/>
     <p:sldId id="277" r:id="rId16"/>
-    <p:sldId id="269" r:id="rId17"/>
-    <p:sldId id="271" r:id="rId18"/>
-    <p:sldId id="272" r:id="rId19"/>
+    <p:sldId id="280" r:id="rId17"/>
+    <p:sldId id="269" r:id="rId18"/>
+    <p:sldId id="271" r:id="rId19"/>
+    <p:sldId id="272" r:id="rId20"/>
   </p:sldIdLst>
   <p:sldSz cx="12192000" cy="6858000"/>
   <p:notesSz cx="6858000" cy="9144000"/>
@@ -1467,11 +1468,11 @@
           <c:showPercent val="0"/>
           <c:showBubbleSize val="0"/>
         </c:dLbls>
-        <c:axId val="188225216"/>
-        <c:axId val="188219728"/>
+        <c:axId val="302099608"/>
+        <c:axId val="302103528"/>
       </c:scatterChart>
       <c:valAx>
-        <c:axId val="188225216"/>
+        <c:axId val="302099608"/>
         <c:scaling>
           <c:orientation val="minMax"/>
         </c:scaling>
@@ -1582,12 +1583,12 @@
             <a:endParaRPr lang="fr-FR"/>
           </a:p>
         </c:txPr>
-        <c:crossAx val="188219728"/>
+        <c:crossAx val="302103528"/>
         <c:crosses val="autoZero"/>
         <c:crossBetween val="midCat"/>
       </c:valAx>
       <c:valAx>
-        <c:axId val="188219728"/>
+        <c:axId val="302103528"/>
         <c:scaling>
           <c:orientation val="maxMin"/>
           <c:max val="35"/>
@@ -1700,7 +1701,7 @@
             <a:endParaRPr lang="fr-FR"/>
           </a:p>
         </c:txPr>
-        <c:crossAx val="188225216"/>
+        <c:crossAx val="302099608"/>
         <c:crosses val="autoZero"/>
         <c:crossBetween val="midCat"/>
         <c:majorUnit val="10"/>
@@ -7612,11 +7613,11 @@
           <c:showPercent val="0"/>
           <c:showBubbleSize val="0"/>
         </c:dLbls>
-        <c:axId val="155839960"/>
-        <c:axId val="155819056"/>
+        <c:axId val="171906048"/>
+        <c:axId val="171902520"/>
       </c:scatterChart>
       <c:valAx>
-        <c:axId val="155839960"/>
+        <c:axId val="171906048"/>
         <c:scaling>
           <c:orientation val="minMax"/>
           <c:max val="6000"/>
@@ -7700,12 +7701,12 @@
         <c:majorTickMark val="none"/>
         <c:minorTickMark val="none"/>
         <c:tickLblPos val="low"/>
-        <c:crossAx val="155819056"/>
+        <c:crossAx val="171902520"/>
         <c:crosses val="autoZero"/>
         <c:crossBetween val="midCat"/>
       </c:valAx>
       <c:valAx>
-        <c:axId val="155819056"/>
+        <c:axId val="171902520"/>
         <c:scaling>
           <c:logBase val="10"/>
           <c:orientation val="minMax"/>
@@ -7784,7 +7785,7 @@
         <c:majorTickMark val="none"/>
         <c:minorTickMark val="none"/>
         <c:tickLblPos val="nextTo"/>
-        <c:crossAx val="155839960"/>
+        <c:crossAx val="171906048"/>
         <c:crosses val="autoZero"/>
         <c:crossBetween val="midCat"/>
       </c:valAx>
@@ -9554,7 +9555,7 @@
           <a:p>
             <a:fld id="{0AA85B57-4734-4699-BEFC-70C8ADF40FD5}" type="datetimeFigureOut">
               <a:rPr lang="fr-FR" smtClean="0"/>
-              <a:t>21/01/2019</a:t>
+              <a:t>29/01/2019</a:t>
             </a:fld>
             <a:endParaRPr lang="fr-FR"/>
           </a:p>
@@ -9724,7 +9725,7 @@
           <a:p>
             <a:fld id="{0AA85B57-4734-4699-BEFC-70C8ADF40FD5}" type="datetimeFigureOut">
               <a:rPr lang="fr-FR" smtClean="0"/>
-              <a:t>21/01/2019</a:t>
+              <a:t>29/01/2019</a:t>
             </a:fld>
             <a:endParaRPr lang="fr-FR"/>
           </a:p>
@@ -9904,7 +9905,7 @@
           <a:p>
             <a:fld id="{0AA85B57-4734-4699-BEFC-70C8ADF40FD5}" type="datetimeFigureOut">
               <a:rPr lang="fr-FR" smtClean="0"/>
-              <a:t>21/01/2019</a:t>
+              <a:t>29/01/2019</a:t>
             </a:fld>
             <a:endParaRPr lang="fr-FR"/>
           </a:p>
@@ -10074,7 +10075,7 @@
           <a:p>
             <a:fld id="{0AA85B57-4734-4699-BEFC-70C8ADF40FD5}" type="datetimeFigureOut">
               <a:rPr lang="fr-FR" smtClean="0"/>
-              <a:t>21/01/2019</a:t>
+              <a:t>29/01/2019</a:t>
             </a:fld>
             <a:endParaRPr lang="fr-FR"/>
           </a:p>
@@ -10320,7 +10321,7 @@
           <a:p>
             <a:fld id="{0AA85B57-4734-4699-BEFC-70C8ADF40FD5}" type="datetimeFigureOut">
               <a:rPr lang="fr-FR" smtClean="0"/>
-              <a:t>21/01/2019</a:t>
+              <a:t>29/01/2019</a:t>
             </a:fld>
             <a:endParaRPr lang="fr-FR"/>
           </a:p>
@@ -10552,7 +10553,7 @@
           <a:p>
             <a:fld id="{0AA85B57-4734-4699-BEFC-70C8ADF40FD5}" type="datetimeFigureOut">
               <a:rPr lang="fr-FR" smtClean="0"/>
-              <a:t>21/01/2019</a:t>
+              <a:t>29/01/2019</a:t>
             </a:fld>
             <a:endParaRPr lang="fr-FR"/>
           </a:p>
@@ -10919,7 +10920,7 @@
           <a:p>
             <a:fld id="{0AA85B57-4734-4699-BEFC-70C8ADF40FD5}" type="datetimeFigureOut">
               <a:rPr lang="fr-FR" smtClean="0"/>
-              <a:t>21/01/2019</a:t>
+              <a:t>29/01/2019</a:t>
             </a:fld>
             <a:endParaRPr lang="fr-FR"/>
           </a:p>
@@ -11037,7 +11038,7 @@
           <a:p>
             <a:fld id="{0AA85B57-4734-4699-BEFC-70C8ADF40FD5}" type="datetimeFigureOut">
               <a:rPr lang="fr-FR" smtClean="0"/>
-              <a:t>21/01/2019</a:t>
+              <a:t>29/01/2019</a:t>
             </a:fld>
             <a:endParaRPr lang="fr-FR"/>
           </a:p>
@@ -11132,7 +11133,7 @@
           <a:p>
             <a:fld id="{0AA85B57-4734-4699-BEFC-70C8ADF40FD5}" type="datetimeFigureOut">
               <a:rPr lang="fr-FR" smtClean="0"/>
-              <a:t>21/01/2019</a:t>
+              <a:t>29/01/2019</a:t>
             </a:fld>
             <a:endParaRPr lang="fr-FR"/>
           </a:p>
@@ -11409,7 +11410,7 @@
           <a:p>
             <a:fld id="{0AA85B57-4734-4699-BEFC-70C8ADF40FD5}" type="datetimeFigureOut">
               <a:rPr lang="fr-FR" smtClean="0"/>
-              <a:t>21/01/2019</a:t>
+              <a:t>29/01/2019</a:t>
             </a:fld>
             <a:endParaRPr lang="fr-FR"/>
           </a:p>
@@ -11662,7 +11663,7 @@
           <a:p>
             <a:fld id="{0AA85B57-4734-4699-BEFC-70C8ADF40FD5}" type="datetimeFigureOut">
               <a:rPr lang="fr-FR" smtClean="0"/>
-              <a:t>21/01/2019</a:t>
+              <a:t>29/01/2019</a:t>
             </a:fld>
             <a:endParaRPr lang="fr-FR"/>
           </a:p>
@@ -11875,7 +11876,7 @@
           <a:p>
             <a:fld id="{0AA85B57-4734-4699-BEFC-70C8ADF40FD5}" type="datetimeFigureOut">
               <a:rPr lang="fr-FR" smtClean="0"/>
-              <a:t>21/01/2019</a:t>
+              <a:t>29/01/2019</a:t>
             </a:fld>
             <a:endParaRPr lang="fr-FR"/>
           </a:p>
@@ -13360,8 +13361,8 @@
                   </p:style>
                 </p:cxnSp>
               </p:grpSp>
-              <mc:AlternateContent xmlns:mc="http://schemas.openxmlformats.org/markup-compatibility/2006">
-                <mc:Choice xmlns:a14="http://schemas.microsoft.com/office/drawing/2010/main" Requires="a14">
+              <mc:AlternateContent xmlns:mc="http://schemas.openxmlformats.org/markup-compatibility/2006" xmlns:a14="http://schemas.microsoft.com/office/drawing/2010/main">
+                <mc:Choice Requires="a14">
                   <p:sp>
                     <p:nvSpPr>
                       <p:cNvPr id="101" name="Zone de texte 153"/>
@@ -13458,7 +13459,7 @@
                     </p:txBody>
                   </p:sp>
                 </mc:Choice>
-                <mc:Fallback>
+                <mc:Fallback xmlns="">
                   <p:sp>
                     <p:nvSpPr>
                       <p:cNvPr id="101" name="Zone de texte 153"/>
@@ -13501,8 +13502,8 @@
                   </p:sp>
                 </mc:Fallback>
               </mc:AlternateContent>
-              <mc:AlternateContent xmlns:mc="http://schemas.openxmlformats.org/markup-compatibility/2006">
-                <mc:Choice xmlns:a14="http://schemas.microsoft.com/office/drawing/2010/main" Requires="a14">
+              <mc:AlternateContent xmlns:mc="http://schemas.openxmlformats.org/markup-compatibility/2006" xmlns:a14="http://schemas.microsoft.com/office/drawing/2010/main">
+                <mc:Choice Requires="a14">
                   <p:sp>
                     <p:nvSpPr>
                       <p:cNvPr id="102" name="Zone de texte 154"/>
@@ -13599,7 +13600,7 @@
                     </p:txBody>
                   </p:sp>
                 </mc:Choice>
-                <mc:Fallback>
+                <mc:Fallback xmlns="">
                   <p:sp>
                     <p:nvSpPr>
                       <p:cNvPr id="102" name="Zone de texte 154"/>
@@ -14141,8 +14142,8 @@
               </p:style>
             </p:cxnSp>
           </p:grpSp>
-          <mc:AlternateContent xmlns:mc="http://schemas.openxmlformats.org/markup-compatibility/2006">
-            <mc:Choice xmlns:a14="http://schemas.microsoft.com/office/drawing/2010/main" Requires="a14">
+          <mc:AlternateContent xmlns:mc="http://schemas.openxmlformats.org/markup-compatibility/2006" xmlns:a14="http://schemas.microsoft.com/office/drawing/2010/main">
+            <mc:Choice Requires="a14">
               <p:sp>
                 <p:nvSpPr>
                   <p:cNvPr id="91" name="Zone de texte 153"/>
@@ -14245,7 +14246,7 @@
                 </p:txBody>
               </p:sp>
             </mc:Choice>
-            <mc:Fallback>
+            <mc:Fallback xmlns="">
               <p:sp>
                 <p:nvSpPr>
                   <p:cNvPr id="91" name="Zone de texte 153"/>
@@ -14288,8 +14289,8 @@
               </p:sp>
             </mc:Fallback>
           </mc:AlternateContent>
-          <mc:AlternateContent xmlns:mc="http://schemas.openxmlformats.org/markup-compatibility/2006">
-            <mc:Choice xmlns:a14="http://schemas.microsoft.com/office/drawing/2010/main" Requires="a14">
+          <mc:AlternateContent xmlns:mc="http://schemas.openxmlformats.org/markup-compatibility/2006" xmlns:a14="http://schemas.microsoft.com/office/drawing/2010/main">
+            <mc:Choice Requires="a14">
               <p:sp>
                 <p:nvSpPr>
                   <p:cNvPr id="92" name="Zone de texte 153"/>
@@ -14392,7 +14393,7 @@
                 </p:txBody>
               </p:sp>
             </mc:Choice>
-            <mc:Fallback>
+            <mc:Fallback xmlns="">
               <p:sp>
                 <p:nvSpPr>
                   <p:cNvPr id="92" name="Zone de texte 153"/>
@@ -14483,8 +14484,8 @@
             </a:p>
           </p:txBody>
         </p:sp>
-        <mc:AlternateContent xmlns:mc="http://schemas.openxmlformats.org/markup-compatibility/2006">
-          <mc:Choice xmlns:a14="http://schemas.microsoft.com/office/drawing/2010/main" Requires="a14">
+        <mc:AlternateContent xmlns:mc="http://schemas.openxmlformats.org/markup-compatibility/2006" xmlns:a14="http://schemas.microsoft.com/office/drawing/2010/main">
+          <mc:Choice Requires="a14">
             <p:sp>
               <p:nvSpPr>
                 <p:cNvPr id="88" name="Zone de texte 153"/>
@@ -14563,7 +14564,7 @@
               </p:txBody>
             </p:sp>
           </mc:Choice>
-          <mc:Fallback>
+          <mc:Fallback xmlns="">
             <p:sp>
               <p:nvSpPr>
                 <p:cNvPr id="88" name="Zone de texte 153"/>
@@ -14665,21 +14666,21 @@
                 <a:gridCol w="1726819">
                   <a:extLst>
                     <a:ext uri="{9D8B030D-6E8A-4147-A177-3AD203B41FA5}">
-                      <a16:colId xmlns="" xmlns:a16="http://schemas.microsoft.com/office/drawing/2014/main" val="20000"/>
+                      <a16:colId xmlns:a16="http://schemas.microsoft.com/office/drawing/2014/main" xmlns="" val="20000"/>
                     </a:ext>
                   </a:extLst>
                 </a:gridCol>
                 <a:gridCol w="1726819">
                   <a:extLst>
                     <a:ext uri="{9D8B030D-6E8A-4147-A177-3AD203B41FA5}">
-                      <a16:colId xmlns="" xmlns:a16="http://schemas.microsoft.com/office/drawing/2014/main" val="20001"/>
+                      <a16:colId xmlns:a16="http://schemas.microsoft.com/office/drawing/2014/main" xmlns="" val="20001"/>
                     </a:ext>
                   </a:extLst>
                 </a:gridCol>
                 <a:gridCol w="1726819">
                   <a:extLst>
                     <a:ext uri="{9D8B030D-6E8A-4147-A177-3AD203B41FA5}">
-                      <a16:colId xmlns="" xmlns:a16="http://schemas.microsoft.com/office/drawing/2014/main" val="20002"/>
+                      <a16:colId xmlns:a16="http://schemas.microsoft.com/office/drawing/2014/main" xmlns="" val="20002"/>
                     </a:ext>
                   </a:extLst>
                 </a:gridCol>
@@ -14807,7 +14808,7 @@
                 </a:tc>
                 <a:extLst>
                   <a:ext uri="{0D108BD9-81ED-4DB2-BD59-A6C34878D82A}">
-                    <a16:rowId xmlns="" xmlns:a16="http://schemas.microsoft.com/office/drawing/2014/main" val="10000"/>
+                    <a16:rowId xmlns:a16="http://schemas.microsoft.com/office/drawing/2014/main" xmlns="" val="10000"/>
                   </a:ext>
                 </a:extLst>
               </a:tr>
@@ -14939,7 +14940,7 @@
                 </a:tc>
                 <a:extLst>
                   <a:ext uri="{0D108BD9-81ED-4DB2-BD59-A6C34878D82A}">
-                    <a16:rowId xmlns="" xmlns:a16="http://schemas.microsoft.com/office/drawing/2014/main" val="10001"/>
+                    <a16:rowId xmlns:a16="http://schemas.microsoft.com/office/drawing/2014/main" xmlns="" val="10001"/>
                   </a:ext>
                 </a:extLst>
               </a:tr>
@@ -15075,7 +15076,7 @@
                 </a:tc>
                 <a:extLst>
                   <a:ext uri="{0D108BD9-81ED-4DB2-BD59-A6C34878D82A}">
-                    <a16:rowId xmlns="" xmlns:a16="http://schemas.microsoft.com/office/drawing/2014/main" val="10002"/>
+                    <a16:rowId xmlns:a16="http://schemas.microsoft.com/office/drawing/2014/main" xmlns="" val="10002"/>
                   </a:ext>
                 </a:extLst>
               </a:tr>
@@ -15239,7 +15240,7 @@
                 </a:tc>
                 <a:extLst>
                   <a:ext uri="{0D108BD9-81ED-4DB2-BD59-A6C34878D82A}">
-                    <a16:rowId xmlns="" xmlns:a16="http://schemas.microsoft.com/office/drawing/2014/main" val="10003"/>
+                    <a16:rowId xmlns:a16="http://schemas.microsoft.com/office/drawing/2014/main" xmlns="" val="10003"/>
                   </a:ext>
                 </a:extLst>
               </a:tr>
@@ -15314,14 +15315,14 @@
                     <a:gridCol w="4728396">
                       <a:extLst>
                         <a:ext uri="{9D8B030D-6E8A-4147-A177-3AD203B41FA5}">
-                          <a16:colId xmlns="" xmlns:a16="http://schemas.microsoft.com/office/drawing/2014/main" val="20000"/>
+                          <a16:colId xmlns:a16="http://schemas.microsoft.com/office/drawing/2014/main" xmlns="" val="20000"/>
                         </a:ext>
                       </a:extLst>
                     </a:gridCol>
                     <a:gridCol w="3399604">
                       <a:extLst>
                         <a:ext uri="{9D8B030D-6E8A-4147-A177-3AD203B41FA5}">
-                          <a16:colId xmlns="" xmlns:a16="http://schemas.microsoft.com/office/drawing/2014/main" val="20001"/>
+                          <a16:colId xmlns:a16="http://schemas.microsoft.com/office/drawing/2014/main" xmlns="" val="20001"/>
                         </a:ext>
                       </a:extLst>
                     </a:gridCol>
@@ -15419,7 +15420,7 @@
                     </a:tc>
                     <a:extLst>
                       <a:ext uri="{0D108BD9-81ED-4DB2-BD59-A6C34878D82A}">
-                        <a16:rowId xmlns="" xmlns:a16="http://schemas.microsoft.com/office/drawing/2014/main" val="10000"/>
+                        <a16:rowId xmlns:a16="http://schemas.microsoft.com/office/drawing/2014/main" xmlns="" val="10000"/>
                       </a:ext>
                     </a:extLst>
                   </a:tr>
@@ -15630,7 +15631,7 @@
                     </a:tc>
                     <a:extLst>
                       <a:ext uri="{0D108BD9-81ED-4DB2-BD59-A6C34878D82A}">
-                        <a16:rowId xmlns="" xmlns:a16="http://schemas.microsoft.com/office/drawing/2014/main" val="10001"/>
+                        <a16:rowId xmlns:a16="http://schemas.microsoft.com/office/drawing/2014/main" xmlns="" val="10001"/>
                       </a:ext>
                     </a:extLst>
                   </a:tr>
@@ -15887,7 +15888,7 @@
                     </a:tc>
                     <a:extLst>
                       <a:ext uri="{0D108BD9-81ED-4DB2-BD59-A6C34878D82A}">
-                        <a16:rowId xmlns="" xmlns:a16="http://schemas.microsoft.com/office/drawing/2014/main" val="10002"/>
+                        <a16:rowId xmlns:a16="http://schemas.microsoft.com/office/drawing/2014/main" xmlns="" val="10002"/>
                       </a:ext>
                     </a:extLst>
                   </a:tr>
@@ -16175,7 +16176,7 @@
                     </a:tc>
                     <a:extLst>
                       <a:ext uri="{0D108BD9-81ED-4DB2-BD59-A6C34878D82A}">
-                        <a16:rowId xmlns="" xmlns:a16="http://schemas.microsoft.com/office/drawing/2014/main" val="10003"/>
+                        <a16:rowId xmlns:a16="http://schemas.microsoft.com/office/drawing/2014/main" xmlns="" val="10003"/>
                       </a:ext>
                     </a:extLst>
                   </a:tr>
@@ -16395,7 +16396,7 @@
                     </a:tc>
                     <a:extLst>
                       <a:ext uri="{0D108BD9-81ED-4DB2-BD59-A6C34878D82A}">
-                        <a16:rowId xmlns="" xmlns:a16="http://schemas.microsoft.com/office/drawing/2014/main" val="10004"/>
+                        <a16:rowId xmlns:a16="http://schemas.microsoft.com/office/drawing/2014/main" xmlns="" val="10004"/>
                       </a:ext>
                     </a:extLst>
                   </a:tr>
@@ -16846,14 +16847,14 @@
                     <a:gridCol w="1726819">
                       <a:extLst>
                         <a:ext uri="{9D8B030D-6E8A-4147-A177-3AD203B41FA5}">
-                          <a16:colId xmlns="" xmlns:a16="http://schemas.microsoft.com/office/drawing/2014/main" val="20000"/>
+                          <a16:colId xmlns:a16="http://schemas.microsoft.com/office/drawing/2014/main" xmlns="" val="20000"/>
                         </a:ext>
                       </a:extLst>
                     </a:gridCol>
                     <a:gridCol w="1726819">
                       <a:extLst>
                         <a:ext uri="{9D8B030D-6E8A-4147-A177-3AD203B41FA5}">
-                          <a16:colId xmlns="" xmlns:a16="http://schemas.microsoft.com/office/drawing/2014/main" val="20001"/>
+                          <a16:colId xmlns:a16="http://schemas.microsoft.com/office/drawing/2014/main" xmlns="" val="20001"/>
                         </a:ext>
                       </a:extLst>
                     </a:gridCol>
@@ -16949,7 +16950,7 @@
                     </a:tc>
                     <a:extLst>
                       <a:ext uri="{0D108BD9-81ED-4DB2-BD59-A6C34878D82A}">
-                        <a16:rowId xmlns="" xmlns:a16="http://schemas.microsoft.com/office/drawing/2014/main" val="10000"/>
+                        <a16:rowId xmlns:a16="http://schemas.microsoft.com/office/drawing/2014/main" xmlns="" val="10000"/>
                       </a:ext>
                     </a:extLst>
                   </a:tr>
@@ -17047,7 +17048,7 @@
                     </a:tc>
                     <a:extLst>
                       <a:ext uri="{0D108BD9-81ED-4DB2-BD59-A6C34878D82A}">
-                        <a16:rowId xmlns="" xmlns:a16="http://schemas.microsoft.com/office/drawing/2014/main" val="10001"/>
+                        <a16:rowId xmlns:a16="http://schemas.microsoft.com/office/drawing/2014/main" xmlns="" val="10001"/>
                       </a:ext>
                     </a:extLst>
                   </a:tr>
@@ -17158,7 +17159,7 @@
                     </a:tc>
                     <a:extLst>
                       <a:ext uri="{0D108BD9-81ED-4DB2-BD59-A6C34878D82A}">
-                        <a16:rowId xmlns="" xmlns:a16="http://schemas.microsoft.com/office/drawing/2014/main" val="10002"/>
+                        <a16:rowId xmlns:a16="http://schemas.microsoft.com/office/drawing/2014/main" xmlns="" val="10002"/>
                       </a:ext>
                     </a:extLst>
                   </a:tr>
@@ -17269,7 +17270,7 @@
                     </a:tc>
                     <a:extLst>
                       <a:ext uri="{0D108BD9-81ED-4DB2-BD59-A6C34878D82A}">
-                        <a16:rowId xmlns="" xmlns:a16="http://schemas.microsoft.com/office/drawing/2014/main" val="10003"/>
+                        <a16:rowId xmlns:a16="http://schemas.microsoft.com/office/drawing/2014/main" xmlns="" val="10003"/>
                       </a:ext>
                     </a:extLst>
                   </a:tr>
@@ -17399,7 +17400,7 @@
                     </a:tc>
                     <a:extLst>
                       <a:ext uri="{0D108BD9-81ED-4DB2-BD59-A6C34878D82A}">
-                        <a16:rowId xmlns="" xmlns:a16="http://schemas.microsoft.com/office/drawing/2014/main" val="10004"/>
+                        <a16:rowId xmlns:a16="http://schemas.microsoft.com/office/drawing/2014/main" xmlns="" val="10004"/>
                       </a:ext>
                     </a:extLst>
                   </a:tr>
@@ -23368,6 +23369,858 @@
       </p:grpSpPr>
       <p:grpSp>
         <p:nvGrpSpPr>
+          <p:cNvPr id="53" name="Groupe 52"/>
+          <p:cNvGrpSpPr/>
+          <p:nvPr/>
+        </p:nvGrpSpPr>
+        <p:grpSpPr>
+          <a:xfrm>
+            <a:off x="2002207" y="1058576"/>
+            <a:ext cx="8857670" cy="3294424"/>
+            <a:chOff x="1468807" y="1185576"/>
+            <a:chExt cx="8857670" cy="3294424"/>
+          </a:xfrm>
+        </p:grpSpPr>
+        <p:grpSp>
+          <p:nvGrpSpPr>
+            <p:cNvPr id="50" name="Groupe 49"/>
+            <p:cNvGrpSpPr/>
+            <p:nvPr/>
+          </p:nvGrpSpPr>
+          <p:grpSpPr>
+            <a:xfrm>
+              <a:off x="1468807" y="1185576"/>
+              <a:ext cx="8857670" cy="3294424"/>
+              <a:chOff x="1468807" y="1185576"/>
+              <a:chExt cx="8857670" cy="3294424"/>
+            </a:xfrm>
+          </p:grpSpPr>
+          <p:grpSp>
+            <p:nvGrpSpPr>
+              <p:cNvPr id="39" name="Groupe 38"/>
+              <p:cNvGrpSpPr/>
+              <p:nvPr/>
+            </p:nvGrpSpPr>
+            <p:grpSpPr>
+              <a:xfrm>
+                <a:off x="1468807" y="1185576"/>
+                <a:ext cx="6292256" cy="3257652"/>
+                <a:chOff x="1468807" y="1185576"/>
+                <a:chExt cx="6292256" cy="3257652"/>
+              </a:xfrm>
+            </p:grpSpPr>
+            <p:grpSp>
+              <p:nvGrpSpPr>
+                <p:cNvPr id="23" name="Groupe 22"/>
+                <p:cNvGrpSpPr/>
+                <p:nvPr/>
+              </p:nvGrpSpPr>
+              <p:grpSpPr>
+                <a:xfrm>
+                  <a:off x="1468807" y="1185576"/>
+                  <a:ext cx="5990122" cy="2350901"/>
+                  <a:chOff x="3018538" y="2665055"/>
+                  <a:chExt cx="5990122" cy="2350901"/>
+                </a:xfrm>
+              </p:grpSpPr>
+              <p:sp>
+                <p:nvSpPr>
+                  <p:cNvPr id="27" name="Rectangle 26"/>
+                  <p:cNvSpPr/>
+                  <p:nvPr/>
+                </p:nvSpPr>
+                <p:spPr>
+                  <a:xfrm rot="214608">
+                    <a:off x="4941796" y="4363340"/>
+                    <a:ext cx="1074732" cy="616450"/>
+                  </a:xfrm>
+                  <a:prstGeom prst="rect">
+                    <a:avLst/>
+                  </a:prstGeom>
+                  <a:solidFill>
+                    <a:schemeClr val="bg1"/>
+                  </a:solidFill>
+                  <a:ln w="19050">
+                    <a:solidFill>
+                      <a:schemeClr val="tx1"/>
+                    </a:solidFill>
+                  </a:ln>
+                </p:spPr>
+                <p:style>
+                  <a:lnRef idx="2">
+                    <a:schemeClr val="accent1">
+                      <a:shade val="50000"/>
+                    </a:schemeClr>
+                  </a:lnRef>
+                  <a:fillRef idx="1">
+                    <a:schemeClr val="accent1"/>
+                  </a:fillRef>
+                  <a:effectRef idx="0">
+                    <a:schemeClr val="accent1"/>
+                  </a:effectRef>
+                  <a:fontRef idx="minor">
+                    <a:schemeClr val="lt1"/>
+                  </a:fontRef>
+                </p:style>
+                <p:txBody>
+                  <a:bodyPr rtlCol="0" anchor="ctr"/>
+                  <a:lstStyle/>
+                  <a:p>
+                    <a:pPr algn="ctr"/>
+                    <a:endParaRPr lang="fr-FR"/>
+                  </a:p>
+                </p:txBody>
+              </p:sp>
+              <p:grpSp>
+                <p:nvGrpSpPr>
+                  <p:cNvPr id="28" name="Groupe 27"/>
+                  <p:cNvGrpSpPr/>
+                  <p:nvPr/>
+                </p:nvGrpSpPr>
+                <p:grpSpPr>
+                  <a:xfrm>
+                    <a:off x="3018538" y="2665055"/>
+                    <a:ext cx="5990122" cy="2350901"/>
+                    <a:chOff x="3018538" y="2665055"/>
+                    <a:chExt cx="5990122" cy="2350901"/>
+                  </a:xfrm>
+                </p:grpSpPr>
+                <p:sp>
+                  <p:nvSpPr>
+                    <p:cNvPr id="29" name="Arc 28"/>
+                    <p:cNvSpPr/>
+                    <p:nvPr/>
+                  </p:nvSpPr>
+                  <p:spPr>
+                    <a:xfrm>
+                      <a:off x="3018826" y="2665055"/>
+                      <a:ext cx="5989834" cy="1728085"/>
+                    </a:xfrm>
+                    <a:prstGeom prst="arc">
+                      <a:avLst>
+                        <a:gd name="adj1" fmla="val 522619"/>
+                        <a:gd name="adj2" fmla="val 5476952"/>
+                      </a:avLst>
+                    </a:prstGeom>
+                    <a:ln w="19050">
+                      <a:solidFill>
+                        <a:schemeClr val="tx1"/>
+                      </a:solidFill>
+                    </a:ln>
+                  </p:spPr>
+                  <p:style>
+                    <a:lnRef idx="1">
+                      <a:schemeClr val="accent1"/>
+                    </a:lnRef>
+                    <a:fillRef idx="0">
+                      <a:schemeClr val="accent1"/>
+                    </a:fillRef>
+                    <a:effectRef idx="0">
+                      <a:schemeClr val="accent1"/>
+                    </a:effectRef>
+                    <a:fontRef idx="minor">
+                      <a:schemeClr val="tx1"/>
+                    </a:fontRef>
+                  </p:style>
+                  <p:txBody>
+                    <a:bodyPr rtlCol="0" anchor="ctr"/>
+                    <a:lstStyle/>
+                    <a:p>
+                      <a:pPr algn="ctr"/>
+                      <a:endParaRPr lang="fr-FR"/>
+                    </a:p>
+                  </p:txBody>
+                </p:sp>
+                <p:sp>
+                  <p:nvSpPr>
+                    <p:cNvPr id="30" name="Arc 29"/>
+                    <p:cNvSpPr/>
+                    <p:nvPr/>
+                  </p:nvSpPr>
+                  <p:spPr>
+                    <a:xfrm>
+                      <a:off x="3018538" y="3287871"/>
+                      <a:ext cx="5989834" cy="1728085"/>
+                    </a:xfrm>
+                    <a:prstGeom prst="arc">
+                      <a:avLst>
+                        <a:gd name="adj1" fmla="val 455289"/>
+                        <a:gd name="adj2" fmla="val 5476952"/>
+                      </a:avLst>
+                    </a:prstGeom>
+                    <a:ln w="19050">
+                      <a:solidFill>
+                        <a:schemeClr val="tx1"/>
+                      </a:solidFill>
+                    </a:ln>
+                  </p:spPr>
+                  <p:style>
+                    <a:lnRef idx="1">
+                      <a:schemeClr val="accent1"/>
+                    </a:lnRef>
+                    <a:fillRef idx="0">
+                      <a:schemeClr val="accent1"/>
+                    </a:fillRef>
+                    <a:effectRef idx="0">
+                      <a:schemeClr val="accent1"/>
+                    </a:effectRef>
+                    <a:fontRef idx="minor">
+                      <a:schemeClr val="tx1"/>
+                    </a:fontRef>
+                  </p:style>
+                  <p:txBody>
+                    <a:bodyPr rtlCol="0" anchor="ctr"/>
+                    <a:lstStyle/>
+                    <a:p>
+                      <a:pPr algn="ctr"/>
+                      <a:endParaRPr lang="fr-FR"/>
+                    </a:p>
+                  </p:txBody>
+                </p:sp>
+              </p:grpSp>
+            </p:grpSp>
+            <p:grpSp>
+              <p:nvGrpSpPr>
+                <p:cNvPr id="38" name="Groupe 37"/>
+                <p:cNvGrpSpPr/>
+                <p:nvPr/>
+              </p:nvGrpSpPr>
+              <p:grpSpPr>
+                <a:xfrm>
+                  <a:off x="3373882" y="1669468"/>
+                  <a:ext cx="4387181" cy="2773760"/>
+                  <a:chOff x="3373882" y="1669468"/>
+                  <a:chExt cx="4387181" cy="2773760"/>
+                </a:xfrm>
+              </p:grpSpPr>
+              <p:sp>
+                <p:nvSpPr>
+                  <p:cNvPr id="18" name="ZoneTexte 17"/>
+                  <p:cNvSpPr txBox="1"/>
+                  <p:nvPr/>
+                </p:nvSpPr>
+                <p:spPr>
+                  <a:xfrm>
+                    <a:off x="3373882" y="4073896"/>
+                    <a:ext cx="2357120" cy="369332"/>
+                  </a:xfrm>
+                  <a:prstGeom prst="rect">
+                    <a:avLst/>
+                  </a:prstGeom>
+                  <a:noFill/>
+                </p:spPr>
+                <p:txBody>
+                  <a:bodyPr wrap="none" rtlCol="0">
+                    <a:spAutoFit/>
+                  </a:bodyPr>
+                  <a:lstStyle/>
+                  <a:p>
+                    <a:r>
+                      <a:rPr lang="fr-FR" dirty="0" smtClean="0"/>
+                      <a:t>Palier hydrodynamique</a:t>
+                    </a:r>
+                    <a:endParaRPr lang="fr-FR" dirty="0"/>
+                  </a:p>
+                </p:txBody>
+              </p:sp>
+              <p:sp>
+                <p:nvSpPr>
+                  <p:cNvPr id="25" name="Rectangle 24"/>
+                  <p:cNvSpPr/>
+                  <p:nvPr/>
+                </p:nvSpPr>
+                <p:spPr>
+                  <a:xfrm>
+                    <a:off x="7116205" y="1669468"/>
+                    <a:ext cx="321066" cy="2188395"/>
+                  </a:xfrm>
+                  <a:prstGeom prst="rect">
+                    <a:avLst/>
+                  </a:prstGeom>
+                  <a:solidFill>
+                    <a:schemeClr val="bg1"/>
+                  </a:solidFill>
+                  <a:ln>
+                    <a:solidFill>
+                      <a:schemeClr val="tx1"/>
+                    </a:solidFill>
+                  </a:ln>
+                </p:spPr>
+                <p:style>
+                  <a:lnRef idx="2">
+                    <a:schemeClr val="dk1">
+                      <a:shade val="50000"/>
+                    </a:schemeClr>
+                  </a:lnRef>
+                  <a:fillRef idx="1">
+                    <a:schemeClr val="dk1"/>
+                  </a:fillRef>
+                  <a:effectRef idx="0">
+                    <a:schemeClr val="dk1"/>
+                  </a:effectRef>
+                  <a:fontRef idx="minor">
+                    <a:schemeClr val="lt1"/>
+                  </a:fontRef>
+                </p:style>
+                <p:txBody>
+                  <a:bodyPr rtlCol="0" anchor="ctr"/>
+                  <a:lstStyle/>
+                  <a:p>
+                    <a:pPr algn="ctr"/>
+                    <a:endParaRPr lang="fr-FR" dirty="0"/>
+                  </a:p>
+                </p:txBody>
+              </p:sp>
+              <p:sp>
+                <p:nvSpPr>
+                  <p:cNvPr id="26" name="Rectangle 25"/>
+                  <p:cNvSpPr/>
+                  <p:nvPr/>
+                </p:nvSpPr>
+                <p:spPr>
+                  <a:xfrm>
+                    <a:off x="7222733" y="3868027"/>
+                    <a:ext cx="123290" cy="82193"/>
+                  </a:xfrm>
+                  <a:prstGeom prst="rect">
+                    <a:avLst/>
+                  </a:prstGeom>
+                  <a:ln/>
+                </p:spPr>
+                <p:style>
+                  <a:lnRef idx="2">
+                    <a:schemeClr val="dk1">
+                      <a:shade val="50000"/>
+                    </a:schemeClr>
+                  </a:lnRef>
+                  <a:fillRef idx="1">
+                    <a:schemeClr val="dk1"/>
+                  </a:fillRef>
+                  <a:effectRef idx="0">
+                    <a:schemeClr val="dk1"/>
+                  </a:effectRef>
+                  <a:fontRef idx="minor">
+                    <a:schemeClr val="lt1"/>
+                  </a:fontRef>
+                </p:style>
+                <p:txBody>
+                  <a:bodyPr rtlCol="0" anchor="ctr"/>
+                  <a:lstStyle/>
+                  <a:p>
+                    <a:pPr algn="ctr"/>
+                    <a:endParaRPr lang="fr-FR"/>
+                  </a:p>
+                </p:txBody>
+              </p:sp>
+              <p:sp>
+                <p:nvSpPr>
+                  <p:cNvPr id="22" name="Rectangle 21"/>
+                  <p:cNvSpPr/>
+                  <p:nvPr/>
+                </p:nvSpPr>
+                <p:spPr>
+                  <a:xfrm>
+                    <a:off x="4015372" y="2345810"/>
+                    <a:ext cx="722681" cy="1728085"/>
+                  </a:xfrm>
+                  <a:prstGeom prst="rect">
+                    <a:avLst/>
+                  </a:prstGeom>
+                </p:spPr>
+                <p:style>
+                  <a:lnRef idx="2">
+                    <a:schemeClr val="accent1">
+                      <a:shade val="50000"/>
+                    </a:schemeClr>
+                  </a:lnRef>
+                  <a:fillRef idx="1">
+                    <a:schemeClr val="accent1"/>
+                  </a:fillRef>
+                  <a:effectRef idx="0">
+                    <a:schemeClr val="accent1"/>
+                  </a:effectRef>
+                  <a:fontRef idx="minor">
+                    <a:schemeClr val="lt1"/>
+                  </a:fontRef>
+                </p:style>
+                <p:txBody>
+                  <a:bodyPr rtlCol="0" anchor="ctr"/>
+                  <a:lstStyle/>
+                  <a:p>
+                    <a:pPr algn="ctr"/>
+                    <a:endParaRPr lang="fr-FR"/>
+                  </a:p>
+                </p:txBody>
+              </p:sp>
+              <p:cxnSp>
+                <p:nvCxnSpPr>
+                  <p:cNvPr id="7" name="Connecteur droit 6"/>
+                  <p:cNvCxnSpPr/>
+                  <p:nvPr/>
+                </p:nvCxnSpPr>
+                <p:spPr>
+                  <a:xfrm>
+                    <a:off x="3731927" y="3223205"/>
+                    <a:ext cx="4029136" cy="0"/>
+                  </a:xfrm>
+                  <a:prstGeom prst="line">
+                    <a:avLst/>
+                  </a:prstGeom>
+                  <a:ln w="28575">
+                    <a:solidFill>
+                      <a:schemeClr val="bg2">
+                        <a:lumMod val="25000"/>
+                      </a:schemeClr>
+                    </a:solidFill>
+                    <a:prstDash val="dash"/>
+                  </a:ln>
+                </p:spPr>
+                <p:style>
+                  <a:lnRef idx="1">
+                    <a:schemeClr val="dk1"/>
+                  </a:lnRef>
+                  <a:fillRef idx="0">
+                    <a:schemeClr val="dk1"/>
+                  </a:fillRef>
+                  <a:effectRef idx="0">
+                    <a:schemeClr val="dk1"/>
+                  </a:effectRef>
+                  <a:fontRef idx="minor">
+                    <a:schemeClr val="tx1"/>
+                  </a:fontRef>
+                </p:style>
+              </p:cxnSp>
+              <p:cxnSp>
+                <p:nvCxnSpPr>
+                  <p:cNvPr id="34" name="Connecteur droit avec flèche 33"/>
+                  <p:cNvCxnSpPr/>
+                  <p:nvPr/>
+                </p:nvCxnSpPr>
+                <p:spPr>
+                  <a:xfrm flipV="1">
+                    <a:off x="7284378" y="2743900"/>
+                    <a:ext cx="12715" cy="495196"/>
+                  </a:xfrm>
+                  <a:prstGeom prst="straightConnector1">
+                    <a:avLst/>
+                  </a:prstGeom>
+                  <a:ln w="19050">
+                    <a:solidFill>
+                      <a:schemeClr val="tx1"/>
+                    </a:solidFill>
+                    <a:tailEnd type="triangle"/>
+                  </a:ln>
+                </p:spPr>
+                <p:style>
+                  <a:lnRef idx="1">
+                    <a:schemeClr val="accent1"/>
+                  </a:lnRef>
+                  <a:fillRef idx="0">
+                    <a:schemeClr val="accent1"/>
+                  </a:fillRef>
+                  <a:effectRef idx="0">
+                    <a:schemeClr val="accent1"/>
+                  </a:effectRef>
+                  <a:fontRef idx="minor">
+                    <a:schemeClr val="tx1"/>
+                  </a:fontRef>
+                </p:style>
+              </p:cxnSp>
+            </p:grpSp>
+            <p:sp>
+              <p:nvSpPr>
+                <p:cNvPr id="8" name="Arc 7"/>
+                <p:cNvSpPr/>
+                <p:nvPr/>
+              </p:nvSpPr>
+              <p:spPr>
+                <a:xfrm>
+                  <a:off x="1565230" y="1482958"/>
+                  <a:ext cx="5989834" cy="1735384"/>
+                </a:xfrm>
+                <a:prstGeom prst="arc">
+                  <a:avLst>
+                    <a:gd name="adj1" fmla="val 436790"/>
+                    <a:gd name="adj2" fmla="val 7750145"/>
+                  </a:avLst>
+                </a:prstGeom>
+                <a:ln w="19050">
+                  <a:solidFill>
+                    <a:srgbClr val="FF0000"/>
+                  </a:solidFill>
+                  <a:prstDash val="solid"/>
+                </a:ln>
+              </p:spPr>
+              <p:style>
+                <a:lnRef idx="1">
+                  <a:schemeClr val="accent1"/>
+                </a:lnRef>
+                <a:fillRef idx="0">
+                  <a:schemeClr val="accent1"/>
+                </a:fillRef>
+                <a:effectRef idx="0">
+                  <a:schemeClr val="accent1"/>
+                </a:effectRef>
+                <a:fontRef idx="minor">
+                  <a:schemeClr val="tx1"/>
+                </a:fontRef>
+              </p:style>
+              <p:txBody>
+                <a:bodyPr rtlCol="0" anchor="ctr"/>
+                <a:lstStyle/>
+                <a:p>
+                  <a:pPr algn="ctr"/>
+                  <a:endParaRPr lang="fr-FR"/>
+                </a:p>
+              </p:txBody>
+            </p:sp>
+          </p:grpSp>
+          <p:sp>
+            <p:nvSpPr>
+              <p:cNvPr id="40" name="ZoneTexte 39"/>
+              <p:cNvSpPr txBox="1"/>
+              <p:nvPr/>
+            </p:nvSpPr>
+            <p:spPr>
+              <a:xfrm>
+                <a:off x="6195996" y="4110668"/>
+                <a:ext cx="2300053" cy="369332"/>
+              </a:xfrm>
+              <a:prstGeom prst="rect">
+                <a:avLst/>
+              </a:prstGeom>
+              <a:noFill/>
+            </p:spPr>
+            <p:txBody>
+              <a:bodyPr wrap="none" rtlCol="0">
+                <a:spAutoFit/>
+              </a:bodyPr>
+              <a:lstStyle/>
+              <a:p>
+                <a:r>
+                  <a:rPr lang="fr-FR" dirty="0" smtClean="0"/>
+                  <a:t>Disque en porte à faux</a:t>
+                </a:r>
+                <a:endParaRPr lang="fr-FR" dirty="0"/>
+              </a:p>
+            </p:txBody>
+          </p:sp>
+          <mc:AlternateContent xmlns:mc="http://schemas.openxmlformats.org/markup-compatibility/2006">
+            <mc:Choice xmlns:a14="http://schemas.microsoft.com/office/drawing/2010/main" Requires="a14">
+              <p:sp>
+                <p:nvSpPr>
+                  <p:cNvPr id="41" name="ZoneTexte 40"/>
+                  <p:cNvSpPr txBox="1"/>
+                  <p:nvPr/>
+                </p:nvSpPr>
+                <p:spPr>
+                  <a:xfrm>
+                    <a:off x="7838509" y="2503825"/>
+                    <a:ext cx="2487968" cy="646331"/>
+                  </a:xfrm>
+                  <a:prstGeom prst="rect">
+                    <a:avLst/>
+                  </a:prstGeom>
+                  <a:noFill/>
+                </p:spPr>
+                <p:txBody>
+                  <a:bodyPr wrap="square" rtlCol="0">
+                    <a:spAutoFit/>
+                  </a:bodyPr>
+                  <a:lstStyle/>
+                  <a:p>
+                    <a:r>
+                      <a:rPr lang="fr-FR" dirty="0" smtClean="0"/>
+                      <a:t>Déplacement au niveau du disque</a:t>
+                    </a:r>
+                    <a14:m>
+                      <m:oMath xmlns:m="http://schemas.openxmlformats.org/officeDocument/2006/math">
+                        <m:r>
+                          <a:rPr lang="fr-FR" b="0" i="0" smtClean="0">
+                            <a:latin typeface="Cambria Math" panose="02040503050406030204" pitchFamily="18" charset="0"/>
+                          </a:rPr>
+                          <m:t> </m:t>
+                        </m:r>
+                        <m:acc>
+                          <m:accPr>
+                            <m:chr m:val="̃"/>
+                            <m:ctrlPr>
+                              <a:rPr lang="fr-FR" b="1" i="1" smtClean="0">
+                                <a:latin typeface="Cambria Math" panose="02040503050406030204" pitchFamily="18" charset="0"/>
+                              </a:rPr>
+                            </m:ctrlPr>
+                          </m:accPr>
+                          <m:e>
+                            <m:sSub>
+                              <m:sSubPr>
+                                <m:ctrlPr>
+                                  <a:rPr lang="fr-FR" b="1" i="1">
+                                    <a:latin typeface="Cambria Math" panose="02040503050406030204" pitchFamily="18" charset="0"/>
+                                  </a:rPr>
+                                </m:ctrlPr>
+                              </m:sSubPr>
+                              <m:e>
+                                <m:r>
+                                  <a:rPr lang="fr-FR" b="1" i="1">
+                                    <a:latin typeface="Cambria Math" panose="02040503050406030204" pitchFamily="18" charset="0"/>
+                                  </a:rPr>
+                                  <m:t>𝒒</m:t>
+                                </m:r>
+                              </m:e>
+                              <m:sub>
+                                <m:r>
+                                  <a:rPr lang="fr-FR" b="1" i="1">
+                                    <a:latin typeface="Cambria Math" panose="02040503050406030204" pitchFamily="18" charset="0"/>
+                                  </a:rPr>
+                                  <m:t>𝒕</m:t>
+                                </m:r>
+                                <m:r>
+                                  <a:rPr lang="fr-FR" b="1" i="1" smtClean="0">
+                                    <a:latin typeface="Cambria Math" panose="02040503050406030204" pitchFamily="18" charset="0"/>
+                                  </a:rPr>
+                                  <m:t>𝒉</m:t>
+                                </m:r>
+                                <m:r>
+                                  <a:rPr lang="fr-FR" b="1" i="1">
+                                    <a:latin typeface="Cambria Math" panose="02040503050406030204" pitchFamily="18" charset="0"/>
+                                  </a:rPr>
+                                  <m:t> </m:t>
+                                </m:r>
+                              </m:sub>
+                            </m:sSub>
+                          </m:e>
+                        </m:acc>
+                      </m:oMath>
+                    </a14:m>
+                    <a:endParaRPr lang="fr-FR" dirty="0"/>
+                  </a:p>
+                </p:txBody>
+              </p:sp>
+            </mc:Choice>
+            <mc:Fallback>
+              <p:sp>
+                <p:nvSpPr>
+                  <p:cNvPr id="41" name="ZoneTexte 40"/>
+                  <p:cNvSpPr txBox="1">
+                    <a:spLocks noRot="1" noChangeAspect="1" noMove="1" noResize="1" noEditPoints="1" noAdjustHandles="1" noChangeArrowheads="1" noChangeShapeType="1" noTextEdit="1"/>
+                  </p:cNvSpPr>
+                  <p:nvPr/>
+                </p:nvSpPr>
+                <p:spPr>
+                  <a:xfrm>
+                    <a:off x="7838509" y="2503825"/>
+                    <a:ext cx="2487968" cy="646331"/>
+                  </a:xfrm>
+                  <a:prstGeom prst="rect">
+                    <a:avLst/>
+                  </a:prstGeom>
+                  <a:blipFill rotWithShape="0">
+                    <a:blip r:embed="rId2"/>
+                    <a:stretch>
+                      <a:fillRect l="-1961" t="-5660" b="-14151"/>
+                    </a:stretch>
+                  </a:blipFill>
+                </p:spPr>
+                <p:txBody>
+                  <a:bodyPr/>
+                  <a:lstStyle/>
+                  <a:p>
+                    <a:r>
+                      <a:rPr lang="fr-FR">
+                        <a:noFill/>
+                      </a:rPr>
+                      <a:t> </a:t>
+                    </a:r>
+                  </a:p>
+                </p:txBody>
+              </p:sp>
+            </mc:Fallback>
+          </mc:AlternateContent>
+          <p:cxnSp>
+            <p:nvCxnSpPr>
+              <p:cNvPr id="43" name="Connecteur en arc 42"/>
+              <p:cNvCxnSpPr>
+                <a:stCxn id="41" idx="1"/>
+              </p:cNvCxnSpPr>
+              <p:nvPr/>
+            </p:nvCxnSpPr>
+            <p:spPr>
+              <a:xfrm rot="10800000" flipV="1">
+                <a:off x="7300505" y="2826991"/>
+                <a:ext cx="538004" cy="199444"/>
+              </a:xfrm>
+              <a:prstGeom prst="curvedConnector3">
+                <a:avLst/>
+              </a:prstGeom>
+              <a:ln>
+                <a:tailEnd type="triangle"/>
+              </a:ln>
+            </p:spPr>
+            <p:style>
+              <a:lnRef idx="1">
+                <a:schemeClr val="dk1"/>
+              </a:lnRef>
+              <a:fillRef idx="0">
+                <a:schemeClr val="dk1"/>
+              </a:fillRef>
+              <a:effectRef idx="0">
+                <a:schemeClr val="dk1"/>
+              </a:effectRef>
+              <a:fontRef idx="minor">
+                <a:schemeClr val="tx1"/>
+              </a:fontRef>
+            </p:style>
+          </p:cxnSp>
+          <p:sp>
+            <p:nvSpPr>
+              <p:cNvPr id="47" name="ZoneTexte 46"/>
+              <p:cNvSpPr txBox="1"/>
+              <p:nvPr/>
+            </p:nvSpPr>
+            <p:spPr>
+              <a:xfrm>
+                <a:off x="4975232" y="2033964"/>
+                <a:ext cx="1339213" cy="369332"/>
+              </a:xfrm>
+              <a:prstGeom prst="rect">
+                <a:avLst/>
+              </a:prstGeom>
+              <a:noFill/>
+            </p:spPr>
+            <p:txBody>
+              <a:bodyPr wrap="square" rtlCol="0">
+                <a:spAutoFit/>
+              </a:bodyPr>
+              <a:lstStyle/>
+              <a:p>
+                <a:r>
+                  <a:rPr lang="fr-FR" dirty="0" smtClean="0"/>
+                  <a:t>Fibre neutre</a:t>
+                </a:r>
+                <a:endParaRPr lang="fr-FR" dirty="0"/>
+              </a:p>
+            </p:txBody>
+          </p:sp>
+          <p:cxnSp>
+            <p:nvCxnSpPr>
+              <p:cNvPr id="48" name="Connecteur en arc 47"/>
+              <p:cNvCxnSpPr>
+                <a:stCxn id="47" idx="2"/>
+              </p:cNvCxnSpPr>
+              <p:nvPr/>
+            </p:nvCxnSpPr>
+            <p:spPr>
+              <a:xfrm rot="16200000" flipH="1">
+                <a:off x="5731404" y="2316730"/>
+                <a:ext cx="623140" cy="796271"/>
+              </a:xfrm>
+              <a:prstGeom prst="curvedConnector2">
+                <a:avLst/>
+              </a:prstGeom>
+              <a:ln>
+                <a:solidFill>
+                  <a:schemeClr val="tx1"/>
+                </a:solidFill>
+                <a:tailEnd type="triangle"/>
+              </a:ln>
+            </p:spPr>
+            <p:style>
+              <a:lnRef idx="1">
+                <a:schemeClr val="accent1"/>
+              </a:lnRef>
+              <a:fillRef idx="0">
+                <a:schemeClr val="accent1"/>
+              </a:fillRef>
+              <a:effectRef idx="0">
+                <a:schemeClr val="accent1"/>
+              </a:effectRef>
+              <a:fontRef idx="minor">
+                <a:schemeClr val="tx1"/>
+              </a:fontRef>
+            </p:style>
+          </p:cxnSp>
+        </p:grpSp>
+        <p:sp>
+          <p:nvSpPr>
+            <p:cNvPr id="51" name="Ellipse 50"/>
+            <p:cNvSpPr/>
+            <p:nvPr/>
+          </p:nvSpPr>
+          <p:spPr>
+            <a:xfrm>
+              <a:off x="7263344" y="2649014"/>
+              <a:ext cx="67499" cy="84722"/>
+            </a:xfrm>
+            <a:prstGeom prst="ellipse">
+              <a:avLst/>
+            </a:prstGeom>
+            <a:solidFill>
+              <a:srgbClr val="FF0000"/>
+            </a:solidFill>
+            <a:ln>
+              <a:solidFill>
+                <a:srgbClr val="FF0000"/>
+              </a:solidFill>
+            </a:ln>
+          </p:spPr>
+          <p:style>
+            <a:lnRef idx="2">
+              <a:schemeClr val="accent1">
+                <a:shade val="50000"/>
+              </a:schemeClr>
+            </a:lnRef>
+            <a:fillRef idx="1">
+              <a:schemeClr val="accent1"/>
+            </a:fillRef>
+            <a:effectRef idx="0">
+              <a:schemeClr val="accent1"/>
+            </a:effectRef>
+            <a:fontRef idx="minor">
+              <a:schemeClr val="lt1"/>
+            </a:fontRef>
+          </p:style>
+          <p:txBody>
+            <a:bodyPr rtlCol="0" anchor="ctr"/>
+            <a:lstStyle/>
+            <a:p>
+              <a:pPr algn="ctr"/>
+              <a:endParaRPr lang="fr-FR"/>
+            </a:p>
+          </p:txBody>
+        </p:sp>
+      </p:grpSp>
+    </p:spTree>
+    <p:extLst>
+      <p:ext uri="{BB962C8B-B14F-4D97-AF65-F5344CB8AC3E}">
+        <p14:creationId xmlns:p14="http://schemas.microsoft.com/office/powerpoint/2010/main" val="3796922304"/>
+      </p:ext>
+    </p:extLst>
+  </p:cSld>
+  <p:clrMapOvr>
+    <a:masterClrMapping/>
+  </p:clrMapOvr>
+</p:sld>
+</file>
+
+<file path=ppt/slides/slide17.xml><?xml version="1.0" encoding="utf-8"?>
+<p:sld xmlns:a="http://schemas.openxmlformats.org/drawingml/2006/main" xmlns:r="http://schemas.openxmlformats.org/officeDocument/2006/relationships" xmlns:p="http://schemas.openxmlformats.org/presentationml/2006/main">
+  <p:cSld>
+    <p:spTree>
+      <p:nvGrpSpPr>
+        <p:cNvPr id="1" name=""/>
+        <p:cNvGrpSpPr/>
+        <p:nvPr/>
+      </p:nvGrpSpPr>
+      <p:grpSpPr>
+        <a:xfrm>
+          <a:off x="0" y="0"/>
+          <a:ext cx="0" cy="0"/>
+          <a:chOff x="0" y="0"/>
+          <a:chExt cx="0" cy="0"/>
+        </a:xfrm>
+      </p:grpSpPr>
+      <p:grpSp>
+        <p:nvGrpSpPr>
           <p:cNvPr id="7" name="Groupe 6"/>
           <p:cNvGrpSpPr/>
           <p:nvPr/>
@@ -25951,7 +26804,7 @@
 </p:sld>
 </file>
 
-<file path=ppt/slides/slide17.xml><?xml version="1.0" encoding="utf-8"?>
+<file path=ppt/slides/slide18.xml><?xml version="1.0" encoding="utf-8"?>
 <p:sld xmlns:a="http://schemas.openxmlformats.org/drawingml/2006/main" xmlns:r="http://schemas.openxmlformats.org/officeDocument/2006/relationships" xmlns:p="http://schemas.openxmlformats.org/presentationml/2006/main">
   <p:cSld>
     <p:spTree>
@@ -27294,8 +28147,14 @@
                         <a:prstGeom prst="rect">
                           <a:avLst/>
                         </a:prstGeom>
-                        <a:grpFill/>
-                        <a:ln/>
+                        <a:solidFill>
+                          <a:schemeClr val="tx1"/>
+                        </a:solidFill>
+                        <a:ln>
+                          <a:solidFill>
+                            <a:schemeClr val="tx1"/>
+                          </a:solidFill>
+                        </a:ln>
                       </p:spPr>
                       <p:style>
                         <a:lnRef idx="2">
@@ -28188,8 +29047,8 @@
               </a:fontRef>
             </p:style>
           </p:cxnSp>
-          <mc:AlternateContent xmlns:mc="http://schemas.openxmlformats.org/markup-compatibility/2006">
-            <mc:Choice xmlns:a14="http://schemas.microsoft.com/office/drawing/2010/main" Requires="a14">
+          <mc:AlternateContent xmlns:mc="http://schemas.openxmlformats.org/markup-compatibility/2006" xmlns:a14="http://schemas.microsoft.com/office/drawing/2010/main">
+            <mc:Choice Requires="a14">
               <p:sp>
                 <p:nvSpPr>
                   <p:cNvPr id="77" name="Zone de texte 153"/>
@@ -28267,7 +29126,7 @@
                 </p:txBody>
               </p:sp>
             </mc:Choice>
-            <mc:Fallback>
+            <mc:Fallback xmlns="">
               <p:sp>
                 <p:nvSpPr>
                   <p:cNvPr id="77" name="Zone de texte 153"/>
@@ -28311,8 +29170,8 @@
               </p:sp>
             </mc:Fallback>
           </mc:AlternateContent>
-          <mc:AlternateContent xmlns:mc="http://schemas.openxmlformats.org/markup-compatibility/2006">
-            <mc:Choice xmlns:a14="http://schemas.microsoft.com/office/drawing/2010/main" Requires="a14">
+          <mc:AlternateContent xmlns:mc="http://schemas.openxmlformats.org/markup-compatibility/2006" xmlns:a14="http://schemas.microsoft.com/office/drawing/2010/main">
+            <mc:Choice Requires="a14">
               <p:sp>
                 <p:nvSpPr>
                   <p:cNvPr id="79" name="Zone de texte 154"/>
@@ -28410,7 +29269,7 @@
                 </p:txBody>
               </p:sp>
             </mc:Choice>
-            <mc:Fallback>
+            <mc:Fallback xmlns="">
               <p:sp>
                 <p:nvSpPr>
                   <p:cNvPr id="79" name="Zone de texte 154"/>
@@ -28454,8 +29313,8 @@
               </p:sp>
             </mc:Fallback>
           </mc:AlternateContent>
-          <mc:AlternateContent xmlns:mc="http://schemas.openxmlformats.org/markup-compatibility/2006">
-            <mc:Choice xmlns:a14="http://schemas.microsoft.com/office/drawing/2010/main" Requires="a14">
+          <mc:AlternateContent xmlns:mc="http://schemas.openxmlformats.org/markup-compatibility/2006" xmlns:a14="http://schemas.microsoft.com/office/drawing/2010/main">
+            <mc:Choice Requires="a14">
               <p:sp>
                 <p:nvSpPr>
                   <p:cNvPr id="81" name="Zone de texte 154"/>
@@ -28533,7 +29392,7 @@
                 </p:txBody>
               </p:sp>
             </mc:Choice>
-            <mc:Fallback>
+            <mc:Fallback xmlns="">
               <p:sp>
                 <p:nvSpPr>
                   <p:cNvPr id="81" name="Zone de texte 154"/>
@@ -28629,7 +29488,7 @@
 </p:sld>
 </file>
 
-<file path=ppt/slides/slide18.xml><?xml version="1.0" encoding="utf-8"?>
+<file path=ppt/slides/slide19.xml><?xml version="1.0" encoding="utf-8"?>
 <p:sld xmlns:a="http://schemas.openxmlformats.org/drawingml/2006/main" xmlns:r="http://schemas.openxmlformats.org/officeDocument/2006/relationships" xmlns:p="http://schemas.openxmlformats.org/presentationml/2006/main">
   <p:cSld>
     <p:spTree>

</xml_diff>